<commit_message>
Worked on the powerpoint
</commit_message>
<xml_diff>
--- a/FactoryPresentation.pptx
+++ b/FactoryPresentation.pptx
@@ -4,6 +4,9 @@
   <p:sldMasterIdLst>
     <p:sldMasterId id="2147483648" r:id="rId1"/>
   </p:sldMasterIdLst>
+  <p:notesMasterIdLst>
+    <p:notesMasterId r:id="rId10"/>
+  </p:notesMasterIdLst>
   <p:sldIdLst>
     <p:sldId id="256" r:id="rId2"/>
     <p:sldId id="257" r:id="rId3"/>
@@ -114,6 +117,463 @@
 </p:presentation>
 </file>
 
+<file path=ppt/notesMasters/notesMaster1.xml><?xml version="1.0" encoding="utf-8"?>
+<p:notesMaster xmlns:a="http://schemas.openxmlformats.org/drawingml/2006/main" xmlns:r="http://schemas.openxmlformats.org/officeDocument/2006/relationships" xmlns:p="http://schemas.openxmlformats.org/presentationml/2006/main">
+  <p:cSld>
+    <p:bg>
+      <p:bgRef idx="1001">
+        <a:schemeClr val="bg1"/>
+      </p:bgRef>
+    </p:bg>
+    <p:spTree>
+      <p:nvGrpSpPr>
+        <p:cNvPr id="1" name=""/>
+        <p:cNvGrpSpPr/>
+        <p:nvPr/>
+      </p:nvGrpSpPr>
+      <p:grpSpPr>
+        <a:xfrm>
+          <a:off x="0" y="0"/>
+          <a:ext cx="0" cy="0"/>
+          <a:chOff x="0" y="0"/>
+          <a:chExt cx="0" cy="0"/>
+        </a:xfrm>
+      </p:grpSpPr>
+      <p:sp>
+        <p:nvSpPr>
+          <p:cNvPr id="2" name="Header Placeholder 1"/>
+          <p:cNvSpPr>
+            <a:spLocks noGrp="1"/>
+          </p:cNvSpPr>
+          <p:nvPr>
+            <p:ph type="hdr" sz="quarter"/>
+          </p:nvPr>
+        </p:nvSpPr>
+        <p:spPr>
+          <a:xfrm>
+            <a:off x="0" y="0"/>
+            <a:ext cx="2971800" cy="457200"/>
+          </a:xfrm>
+          <a:prstGeom prst="rect">
+            <a:avLst/>
+          </a:prstGeom>
+        </p:spPr>
+        <p:txBody>
+          <a:bodyPr vert="horz" lIns="91440" tIns="45720" rIns="91440" bIns="45720" rtlCol="0"/>
+          <a:lstStyle>
+            <a:lvl1pPr algn="l">
+              <a:defRPr sz="1200"/>
+            </a:lvl1pPr>
+          </a:lstStyle>
+          <a:p>
+            <a:endParaRPr lang="en-US"/>
+          </a:p>
+        </p:txBody>
+      </p:sp>
+      <p:sp>
+        <p:nvSpPr>
+          <p:cNvPr id="3" name="Date Placeholder 2"/>
+          <p:cNvSpPr>
+            <a:spLocks noGrp="1"/>
+          </p:cNvSpPr>
+          <p:nvPr>
+            <p:ph type="dt" idx="1"/>
+          </p:nvPr>
+        </p:nvSpPr>
+        <p:spPr>
+          <a:xfrm>
+            <a:off x="3884613" y="0"/>
+            <a:ext cx="2971800" cy="457200"/>
+          </a:xfrm>
+          <a:prstGeom prst="rect">
+            <a:avLst/>
+          </a:prstGeom>
+        </p:spPr>
+        <p:txBody>
+          <a:bodyPr vert="horz" lIns="91440" tIns="45720" rIns="91440" bIns="45720" rtlCol="0"/>
+          <a:lstStyle>
+            <a:lvl1pPr algn="r">
+              <a:defRPr sz="1200"/>
+            </a:lvl1pPr>
+          </a:lstStyle>
+          <a:p>
+            <a:fld id="{55E908C3-C9AB-1543-B0B2-672E506C5F62}" type="datetimeFigureOut">
+              <a:rPr lang="en-US" smtClean="0"/>
+              <a:t>12/1/12</a:t>
+            </a:fld>
+            <a:endParaRPr lang="en-US"/>
+          </a:p>
+        </p:txBody>
+      </p:sp>
+      <p:sp>
+        <p:nvSpPr>
+          <p:cNvPr id="4" name="Slide Image Placeholder 3"/>
+          <p:cNvSpPr>
+            <a:spLocks noGrp="1" noRot="1" noChangeAspect="1"/>
+          </p:cNvSpPr>
+          <p:nvPr>
+            <p:ph type="sldImg" idx="2"/>
+          </p:nvPr>
+        </p:nvSpPr>
+        <p:spPr>
+          <a:xfrm>
+            <a:off x="1143000" y="685800"/>
+            <a:ext cx="4572000" cy="3429000"/>
+          </a:xfrm>
+          <a:prstGeom prst="rect">
+            <a:avLst/>
+          </a:prstGeom>
+          <a:noFill/>
+          <a:ln w="12700">
+            <a:solidFill>
+              <a:prstClr val="black"/>
+            </a:solidFill>
+          </a:ln>
+        </p:spPr>
+        <p:txBody>
+          <a:bodyPr vert="horz" lIns="91440" tIns="45720" rIns="91440" bIns="45720" rtlCol="0" anchor="ctr"/>
+          <a:lstStyle/>
+          <a:p>
+            <a:endParaRPr lang="en-US"/>
+          </a:p>
+        </p:txBody>
+      </p:sp>
+      <p:sp>
+        <p:nvSpPr>
+          <p:cNvPr id="5" name="Notes Placeholder 4"/>
+          <p:cNvSpPr>
+            <a:spLocks noGrp="1"/>
+          </p:cNvSpPr>
+          <p:nvPr>
+            <p:ph type="body" sz="quarter" idx="3"/>
+          </p:nvPr>
+        </p:nvSpPr>
+        <p:spPr>
+          <a:xfrm>
+            <a:off x="685800" y="4343400"/>
+            <a:ext cx="5486400" cy="4114800"/>
+          </a:xfrm>
+          <a:prstGeom prst="rect">
+            <a:avLst/>
+          </a:prstGeom>
+        </p:spPr>
+        <p:txBody>
+          <a:bodyPr vert="horz" lIns="91440" tIns="45720" rIns="91440" bIns="45720" rtlCol="0"/>
+          <a:lstStyle/>
+          <a:p>
+            <a:pPr lvl="0"/>
+            <a:r>
+              <a:rPr lang="en-US" smtClean="0"/>
+              <a:t>Click to edit Master text styles</a:t>
+            </a:r>
+          </a:p>
+          <a:p>
+            <a:pPr lvl="1"/>
+            <a:r>
+              <a:rPr lang="en-US" smtClean="0"/>
+              <a:t>Second level</a:t>
+            </a:r>
+          </a:p>
+          <a:p>
+            <a:pPr lvl="2"/>
+            <a:r>
+              <a:rPr lang="en-US" smtClean="0"/>
+              <a:t>Third level</a:t>
+            </a:r>
+          </a:p>
+          <a:p>
+            <a:pPr lvl="3"/>
+            <a:r>
+              <a:rPr lang="en-US" smtClean="0"/>
+              <a:t>Fourth level</a:t>
+            </a:r>
+          </a:p>
+          <a:p>
+            <a:pPr lvl="4"/>
+            <a:r>
+              <a:rPr lang="en-US" smtClean="0"/>
+              <a:t>Fifth level</a:t>
+            </a:r>
+            <a:endParaRPr lang="en-US"/>
+          </a:p>
+        </p:txBody>
+      </p:sp>
+      <p:sp>
+        <p:nvSpPr>
+          <p:cNvPr id="6" name="Footer Placeholder 5"/>
+          <p:cNvSpPr>
+            <a:spLocks noGrp="1"/>
+          </p:cNvSpPr>
+          <p:nvPr>
+            <p:ph type="ftr" sz="quarter" idx="4"/>
+          </p:nvPr>
+        </p:nvSpPr>
+        <p:spPr>
+          <a:xfrm>
+            <a:off x="0" y="8685213"/>
+            <a:ext cx="2971800" cy="457200"/>
+          </a:xfrm>
+          <a:prstGeom prst="rect">
+            <a:avLst/>
+          </a:prstGeom>
+        </p:spPr>
+        <p:txBody>
+          <a:bodyPr vert="horz" lIns="91440" tIns="45720" rIns="91440" bIns="45720" rtlCol="0" anchor="b"/>
+          <a:lstStyle>
+            <a:lvl1pPr algn="l">
+              <a:defRPr sz="1200"/>
+            </a:lvl1pPr>
+          </a:lstStyle>
+          <a:p>
+            <a:endParaRPr lang="en-US"/>
+          </a:p>
+        </p:txBody>
+      </p:sp>
+      <p:sp>
+        <p:nvSpPr>
+          <p:cNvPr id="7" name="Slide Number Placeholder 6"/>
+          <p:cNvSpPr>
+            <a:spLocks noGrp="1"/>
+          </p:cNvSpPr>
+          <p:nvPr>
+            <p:ph type="sldNum" sz="quarter" idx="5"/>
+          </p:nvPr>
+        </p:nvSpPr>
+        <p:spPr>
+          <a:xfrm>
+            <a:off x="3884613" y="8685213"/>
+            <a:ext cx="2971800" cy="457200"/>
+          </a:xfrm>
+          <a:prstGeom prst="rect">
+            <a:avLst/>
+          </a:prstGeom>
+        </p:spPr>
+        <p:txBody>
+          <a:bodyPr vert="horz" lIns="91440" tIns="45720" rIns="91440" bIns="45720" rtlCol="0" anchor="b"/>
+          <a:lstStyle>
+            <a:lvl1pPr algn="r">
+              <a:defRPr sz="1200"/>
+            </a:lvl1pPr>
+          </a:lstStyle>
+          <a:p>
+            <a:fld id="{B752A1E4-763F-EF4C-A305-9DA13A383502}" type="slidenum">
+              <a:rPr lang="en-US" smtClean="0"/>
+              <a:t>‹#›</a:t>
+            </a:fld>
+            <a:endParaRPr lang="en-US"/>
+          </a:p>
+        </p:txBody>
+      </p:sp>
+    </p:spTree>
+    <p:extLst>
+      <p:ext uri="{BB962C8B-B14F-4D97-AF65-F5344CB8AC3E}">
+        <p14:creationId xmlns:p14="http://schemas.microsoft.com/office/powerpoint/2010/main" val="705795398"/>
+      </p:ext>
+    </p:extLst>
+  </p:cSld>
+  <p:clrMap bg1="lt1" tx1="dk1" bg2="lt2" tx2="dk2" accent1="accent1" accent2="accent2" accent3="accent3" accent4="accent4" accent5="accent5" accent6="accent6" hlink="hlink" folHlink="folHlink"/>
+  <p:notesStyle>
+    <a:lvl1pPr marL="0" algn="l" defTabSz="457200" rtl="0" eaLnBrk="1" latinLnBrk="0" hangingPunct="1">
+      <a:defRPr sz="1200" kern="1200">
+        <a:solidFill>
+          <a:schemeClr val="tx1"/>
+        </a:solidFill>
+        <a:latin typeface="+mn-lt"/>
+        <a:ea typeface="+mn-ea"/>
+        <a:cs typeface="+mn-cs"/>
+      </a:defRPr>
+    </a:lvl1pPr>
+    <a:lvl2pPr marL="457200" algn="l" defTabSz="457200" rtl="0" eaLnBrk="1" latinLnBrk="0" hangingPunct="1">
+      <a:defRPr sz="1200" kern="1200">
+        <a:solidFill>
+          <a:schemeClr val="tx1"/>
+        </a:solidFill>
+        <a:latin typeface="+mn-lt"/>
+        <a:ea typeface="+mn-ea"/>
+        <a:cs typeface="+mn-cs"/>
+      </a:defRPr>
+    </a:lvl2pPr>
+    <a:lvl3pPr marL="914400" algn="l" defTabSz="457200" rtl="0" eaLnBrk="1" latinLnBrk="0" hangingPunct="1">
+      <a:defRPr sz="1200" kern="1200">
+        <a:solidFill>
+          <a:schemeClr val="tx1"/>
+        </a:solidFill>
+        <a:latin typeface="+mn-lt"/>
+        <a:ea typeface="+mn-ea"/>
+        <a:cs typeface="+mn-cs"/>
+      </a:defRPr>
+    </a:lvl3pPr>
+    <a:lvl4pPr marL="1371600" algn="l" defTabSz="457200" rtl="0" eaLnBrk="1" latinLnBrk="0" hangingPunct="1">
+      <a:defRPr sz="1200" kern="1200">
+        <a:solidFill>
+          <a:schemeClr val="tx1"/>
+        </a:solidFill>
+        <a:latin typeface="+mn-lt"/>
+        <a:ea typeface="+mn-ea"/>
+        <a:cs typeface="+mn-cs"/>
+      </a:defRPr>
+    </a:lvl4pPr>
+    <a:lvl5pPr marL="1828800" algn="l" defTabSz="457200" rtl="0" eaLnBrk="1" latinLnBrk="0" hangingPunct="1">
+      <a:defRPr sz="1200" kern="1200">
+        <a:solidFill>
+          <a:schemeClr val="tx1"/>
+        </a:solidFill>
+        <a:latin typeface="+mn-lt"/>
+        <a:ea typeface="+mn-ea"/>
+        <a:cs typeface="+mn-cs"/>
+      </a:defRPr>
+    </a:lvl5pPr>
+    <a:lvl6pPr marL="2286000" algn="l" defTabSz="457200" rtl="0" eaLnBrk="1" latinLnBrk="0" hangingPunct="1">
+      <a:defRPr sz="1200" kern="1200">
+        <a:solidFill>
+          <a:schemeClr val="tx1"/>
+        </a:solidFill>
+        <a:latin typeface="+mn-lt"/>
+        <a:ea typeface="+mn-ea"/>
+        <a:cs typeface="+mn-cs"/>
+      </a:defRPr>
+    </a:lvl6pPr>
+    <a:lvl7pPr marL="2743200" algn="l" defTabSz="457200" rtl="0" eaLnBrk="1" latinLnBrk="0" hangingPunct="1">
+      <a:defRPr sz="1200" kern="1200">
+        <a:solidFill>
+          <a:schemeClr val="tx1"/>
+        </a:solidFill>
+        <a:latin typeface="+mn-lt"/>
+        <a:ea typeface="+mn-ea"/>
+        <a:cs typeface="+mn-cs"/>
+      </a:defRPr>
+    </a:lvl7pPr>
+    <a:lvl8pPr marL="3200400" algn="l" defTabSz="457200" rtl="0" eaLnBrk="1" latinLnBrk="0" hangingPunct="1">
+      <a:defRPr sz="1200" kern="1200">
+        <a:solidFill>
+          <a:schemeClr val="tx1"/>
+        </a:solidFill>
+        <a:latin typeface="+mn-lt"/>
+        <a:ea typeface="+mn-ea"/>
+        <a:cs typeface="+mn-cs"/>
+      </a:defRPr>
+    </a:lvl8pPr>
+    <a:lvl9pPr marL="3657600" algn="l" defTabSz="457200" rtl="0" eaLnBrk="1" latinLnBrk="0" hangingPunct="1">
+      <a:defRPr sz="1200" kern="1200">
+        <a:solidFill>
+          <a:schemeClr val="tx1"/>
+        </a:solidFill>
+        <a:latin typeface="+mn-lt"/>
+        <a:ea typeface="+mn-ea"/>
+        <a:cs typeface="+mn-cs"/>
+      </a:defRPr>
+    </a:lvl9pPr>
+  </p:notesStyle>
+</p:notesMaster>
+</file>
+
+<file path=ppt/notesSlides/notesSlide1.xml><?xml version="1.0" encoding="utf-8"?>
+<p:notes xmlns:a="http://schemas.openxmlformats.org/drawingml/2006/main" xmlns:r="http://schemas.openxmlformats.org/officeDocument/2006/relationships" xmlns:p="http://schemas.openxmlformats.org/presentationml/2006/main">
+  <p:cSld>
+    <p:spTree>
+      <p:nvGrpSpPr>
+        <p:cNvPr id="1" name=""/>
+        <p:cNvGrpSpPr/>
+        <p:nvPr/>
+      </p:nvGrpSpPr>
+      <p:grpSpPr>
+        <a:xfrm>
+          <a:off x="0" y="0"/>
+          <a:ext cx="0" cy="0"/>
+          <a:chOff x="0" y="0"/>
+          <a:chExt cx="0" cy="0"/>
+        </a:xfrm>
+      </p:grpSpPr>
+      <p:sp>
+        <p:nvSpPr>
+          <p:cNvPr id="2" name="Slide Image Placeholder 1"/>
+          <p:cNvSpPr>
+            <a:spLocks noGrp="1" noRot="1" noChangeAspect="1"/>
+          </p:cNvSpPr>
+          <p:nvPr>
+            <p:ph type="sldImg"/>
+          </p:nvPr>
+        </p:nvSpPr>
+        <p:spPr/>
+      </p:sp>
+      <p:sp>
+        <p:nvSpPr>
+          <p:cNvPr id="3" name="Notes Placeholder 2"/>
+          <p:cNvSpPr>
+            <a:spLocks noGrp="1"/>
+          </p:cNvSpPr>
+          <p:nvPr>
+            <p:ph type="body" idx="1"/>
+          </p:nvPr>
+        </p:nvSpPr>
+        <p:spPr/>
+        <p:txBody>
+          <a:bodyPr/>
+          <a:lstStyle/>
+          <a:p>
+            <a:pPr marL="0" marR="0" lvl="1" indent="0" algn="l" defTabSz="457200" rtl="0" eaLnBrk="1" fontAlgn="auto" latinLnBrk="0" hangingPunct="1">
+              <a:lnSpc>
+                <a:spcPct val="100000"/>
+              </a:lnSpc>
+              <a:spcBef>
+                <a:spcPts val="0"/>
+              </a:spcBef>
+              <a:spcAft>
+                <a:spcPts val="0"/>
+              </a:spcAft>
+              <a:buClrTx/>
+              <a:buSzTx/>
+              <a:buFontTx/>
+              <a:buNone/>
+              <a:tabLst/>
+              <a:defRPr/>
+            </a:pPr>
+            <a:r>
+              <a:rPr lang="en-US" dirty="0" smtClean="0"/>
+              <a:t>Integrate V[0]</a:t>
+            </a:r>
+          </a:p>
+          <a:p>
+            <a:endParaRPr lang="en-US" dirty="0"/>
+          </a:p>
+        </p:txBody>
+      </p:sp>
+      <p:sp>
+        <p:nvSpPr>
+          <p:cNvPr id="4" name="Slide Number Placeholder 3"/>
+          <p:cNvSpPr>
+            <a:spLocks noGrp="1"/>
+          </p:cNvSpPr>
+          <p:nvPr>
+            <p:ph type="sldNum" sz="quarter" idx="10"/>
+          </p:nvPr>
+        </p:nvSpPr>
+        <p:spPr/>
+        <p:txBody>
+          <a:bodyPr/>
+          <a:lstStyle/>
+          <a:p>
+            <a:fld id="{B752A1E4-763F-EF4C-A305-9DA13A383502}" type="slidenum">
+              <a:rPr lang="en-US" smtClean="0"/>
+              <a:t>6</a:t>
+            </a:fld>
+            <a:endParaRPr lang="en-US"/>
+          </a:p>
+        </p:txBody>
+      </p:sp>
+    </p:spTree>
+    <p:extLst>
+      <p:ext uri="{BB962C8B-B14F-4D97-AF65-F5344CB8AC3E}">
+        <p14:creationId xmlns:p14="http://schemas.microsoft.com/office/powerpoint/2010/main" val="3520865030"/>
+      </p:ext>
+    </p:extLst>
+  </p:cSld>
+  <p:clrMapOvr>
+    <a:masterClrMapping/>
+  </p:clrMapOvr>
+</p:notes>
+</file>
+
 <file path=ppt/slideLayouts/slideLayout1.xml><?xml version="1.0" encoding="utf-8"?>
 <p:sldLayout xmlns:a="http://schemas.openxmlformats.org/drawingml/2006/main" xmlns:r="http://schemas.openxmlformats.org/officeDocument/2006/relationships" xmlns:p="http://schemas.openxmlformats.org/presentationml/2006/main" type="title" preserve="1">
   <p:cSld name="Title Slide">
@@ -730,7 +1190,7 @@
             <a:spLocks noGrp="1"/>
           </p:cNvSpPr>
           <p:nvPr>
-            <p:ph type="title"/>
+            <p:ph type="title" hasCustomPrompt="1"/>
           </p:nvPr>
         </p:nvSpPr>
         <p:spPr/>
@@ -739,10 +1199,48 @@
           <a:lstStyle/>
           <a:p>
             <a:r>
-              <a:rPr lang="en-US" smtClean="0"/>
-              <a:t>Click to edit Master title style</a:t>
-            </a:r>
-            <a:endParaRPr lang="en-US"/>
+              <a:rPr lang="en-US" dirty="0" smtClean="0">
+                <a:ln w="21590" cmpd="sng">
+                  <a:solidFill>
+                    <a:schemeClr val="tx1"/>
+                  </a:solidFill>
+                  <a:prstDash val="solid"/>
+                </a:ln>
+                <a:solidFill>
+                  <a:srgbClr val="FFFFFF"/>
+                </a:solidFill>
+                <a:effectLst>
+                  <a:outerShdw blurRad="63500" dir="3600000" algn="tl" rotWithShape="0">
+                    <a:srgbClr val="000000">
+                      <a:alpha val="70000"/>
+                    </a:srgbClr>
+                  </a:outerShdw>
+                </a:effectLst>
+                <a:latin typeface="Pokemon Solid Normal"/>
+                <a:cs typeface="Pokemon Solid Normal"/>
+              </a:rPr>
+              <a:t>What Worked</a:t>
+            </a:r>
+            <a:endParaRPr lang="en-US" dirty="0">
+              <a:ln w="21590" cmpd="sng">
+                <a:solidFill>
+                  <a:schemeClr val="tx1"/>
+                </a:solidFill>
+                <a:prstDash val="solid"/>
+              </a:ln>
+              <a:solidFill>
+                <a:srgbClr val="FFFFFF"/>
+              </a:solidFill>
+              <a:effectLst>
+                <a:outerShdw blurRad="63500" dir="3600000" algn="tl" rotWithShape="0">
+                  <a:srgbClr val="000000">
+                    <a:alpha val="70000"/>
+                  </a:srgbClr>
+                </a:outerShdw>
+              </a:effectLst>
+              <a:latin typeface="Pokemon Solid Normal"/>
+              <a:cs typeface="Pokemon Solid Normal"/>
+            </a:endParaRPr>
           </a:p>
         </p:txBody>
       </p:sp>
@@ -3156,6 +3654,147 @@
       </p:grpSpPr>
       <p:sp>
         <p:nvSpPr>
+          <p:cNvPr id="19" name="Round Diagonal Corner Rectangle 18"/>
+          <p:cNvSpPr/>
+          <p:nvPr/>
+        </p:nvSpPr>
+        <p:spPr>
+          <a:xfrm>
+            <a:off x="4242366" y="3929047"/>
+            <a:ext cx="4596835" cy="1159370"/>
+          </a:xfrm>
+          <a:prstGeom prst="round2DiagRect">
+            <a:avLst>
+              <a:gd name="adj1" fmla="val 50000"/>
+              <a:gd name="adj2" fmla="val 0"/>
+            </a:avLst>
+          </a:prstGeom>
+          <a:solidFill>
+            <a:srgbClr val="FFFFB3"/>
+          </a:solidFill>
+          <a:ln w="28575">
+            <a:solidFill>
+              <a:schemeClr val="tx1"/>
+            </a:solidFill>
+          </a:ln>
+          <a:effectLst/>
+        </p:spPr>
+        <p:style>
+          <a:lnRef idx="1">
+            <a:schemeClr val="accent1"/>
+          </a:lnRef>
+          <a:fillRef idx="3">
+            <a:schemeClr val="accent1"/>
+          </a:fillRef>
+          <a:effectRef idx="2">
+            <a:schemeClr val="accent1"/>
+          </a:effectRef>
+          <a:fontRef idx="minor">
+            <a:schemeClr val="lt1"/>
+          </a:fontRef>
+        </p:style>
+        <p:txBody>
+          <a:bodyPr/>
+          <a:lstStyle/>
+          <a:p>
+            <a:endParaRPr lang="en-US" dirty="0"/>
+          </a:p>
+        </p:txBody>
+      </p:sp>
+      <p:sp>
+        <p:nvSpPr>
+          <p:cNvPr id="7" name="Oval 6"/>
+          <p:cNvSpPr/>
+          <p:nvPr/>
+        </p:nvSpPr>
+        <p:spPr>
+          <a:xfrm>
+            <a:off x="-14111" y="4860219"/>
+            <a:ext cx="3287889" cy="727427"/>
+          </a:xfrm>
+          <a:prstGeom prst="ellipse">
+            <a:avLst/>
+          </a:prstGeom>
+          <a:solidFill>
+            <a:schemeClr val="accent2">
+              <a:lumMod val="75000"/>
+            </a:schemeClr>
+          </a:solidFill>
+          <a:ln>
+            <a:noFill/>
+          </a:ln>
+          <a:effectLst/>
+        </p:spPr>
+        <p:style>
+          <a:lnRef idx="1">
+            <a:schemeClr val="accent1"/>
+          </a:lnRef>
+          <a:fillRef idx="3">
+            <a:schemeClr val="accent1"/>
+          </a:fillRef>
+          <a:effectRef idx="2">
+            <a:schemeClr val="accent1"/>
+          </a:effectRef>
+          <a:fontRef idx="minor">
+            <a:schemeClr val="lt1"/>
+          </a:fontRef>
+        </p:style>
+        <p:txBody>
+          <a:bodyPr rtlCol="0" anchor="ctr"/>
+          <a:lstStyle/>
+          <a:p>
+            <a:pPr algn="ctr"/>
+            <a:endParaRPr lang="en-US"/>
+          </a:p>
+        </p:txBody>
+      </p:sp>
+      <p:sp>
+        <p:nvSpPr>
+          <p:cNvPr id="6" name="Oval 5"/>
+          <p:cNvSpPr/>
+          <p:nvPr/>
+        </p:nvSpPr>
+        <p:spPr>
+          <a:xfrm>
+            <a:off x="5551312" y="1676754"/>
+            <a:ext cx="3287889" cy="727427"/>
+          </a:xfrm>
+          <a:prstGeom prst="ellipse">
+            <a:avLst/>
+          </a:prstGeom>
+          <a:solidFill>
+            <a:srgbClr val="953735"/>
+          </a:solidFill>
+          <a:ln>
+            <a:noFill/>
+          </a:ln>
+          <a:effectLst/>
+        </p:spPr>
+        <p:style>
+          <a:lnRef idx="1">
+            <a:schemeClr val="accent1"/>
+          </a:lnRef>
+          <a:fillRef idx="3">
+            <a:schemeClr val="accent1"/>
+          </a:fillRef>
+          <a:effectRef idx="2">
+            <a:schemeClr val="accent1"/>
+          </a:effectRef>
+          <a:fontRef idx="minor">
+            <a:schemeClr val="lt1"/>
+          </a:fontRef>
+        </p:style>
+        <p:txBody>
+          <a:bodyPr rtlCol="0" anchor="ctr"/>
+          <a:lstStyle/>
+          <a:p>
+            <a:pPr algn="ctr"/>
+            <a:endParaRPr lang="en-US"/>
+          </a:p>
+        </p:txBody>
+      </p:sp>
+      <p:sp>
+        <p:nvSpPr>
           <p:cNvPr id="2" name="Title 1"/>
           <p:cNvSpPr>
             <a:spLocks noGrp="1"/>
@@ -3164,21 +3803,51 @@
             <p:ph type="ctrTitle"/>
           </p:nvPr>
         </p:nvSpPr>
-        <p:spPr/>
+        <p:spPr>
+          <a:xfrm>
+            <a:off x="0" y="5587646"/>
+            <a:ext cx="9256889" cy="1470025"/>
+          </a:xfrm>
+          <a:solidFill>
+            <a:schemeClr val="bg1">
+              <a:alpha val="62000"/>
+            </a:schemeClr>
+          </a:solidFill>
+          <a:ln w="57150">
+            <a:noFill/>
+          </a:ln>
+        </p:spPr>
+        <p:style>
+          <a:lnRef idx="2">
+            <a:schemeClr val="accent2"/>
+          </a:lnRef>
+          <a:fillRef idx="1">
+            <a:schemeClr val="lt1"/>
+          </a:fillRef>
+          <a:effectRef idx="0">
+            <a:schemeClr val="accent2"/>
+          </a:effectRef>
+          <a:fontRef idx="minor">
+            <a:schemeClr val="dk1"/>
+          </a:fontRef>
+        </p:style>
         <p:txBody>
           <a:bodyPr/>
           <a:lstStyle/>
           <a:p>
             <a:r>
-              <a:rPr lang="en-US" dirty="0" smtClean="0">
-                <a:ln w="18415" cmpd="sng">
+              <a:rPr lang="en-US" sz="5400" dirty="0" smtClean="0">
+                <a:ln w="34290" cmpd="sng">
                   <a:solidFill>
-                    <a:srgbClr val="FFFFFF"/>
+                    <a:schemeClr val="tx2">
+                      <a:lumMod val="60000"/>
+                      <a:lumOff val="40000"/>
+                    </a:schemeClr>
                   </a:solidFill>
                   <a:prstDash val="solid"/>
                 </a:ln>
                 <a:solidFill>
-                  <a:srgbClr val="FFFFFF"/>
+                  <a:srgbClr val="FFFF00"/>
                 </a:solidFill>
                 <a:effectLst>
                   <a:outerShdw blurRad="63500" dir="3600000" algn="tl" rotWithShape="0">
@@ -3187,20 +3856,23 @@
                     </a:srgbClr>
                   </a:outerShdw>
                 </a:effectLst>
-                <a:latin typeface="Consolas"/>
-                <a:cs typeface="Consolas"/>
+                <a:latin typeface="Pokemon Solid Normal"/>
+                <a:cs typeface="Pokemon Solid Normal"/>
               </a:rPr>
-              <a:t>Team 09</a:t>
-            </a:r>
-            <a:endParaRPr lang="en-US" dirty="0">
-              <a:ln w="18415" cmpd="sng">
-                <a:solidFill>
-                  <a:srgbClr val="FFFFFF"/>
+              <a:t>T.e.a.m.9</a:t>
+            </a:r>
+            <a:endParaRPr lang="en-US" sz="5400" dirty="0">
+              <a:ln w="34290" cmpd="sng">
+                <a:solidFill>
+                  <a:schemeClr val="tx2">
+                    <a:lumMod val="60000"/>
+                    <a:lumOff val="40000"/>
+                  </a:schemeClr>
                 </a:solidFill>
                 <a:prstDash val="solid"/>
               </a:ln>
               <a:solidFill>
-                <a:srgbClr val="FFFFFF"/>
+                <a:srgbClr val="FFFF00"/>
               </a:solidFill>
               <a:effectLst>
                 <a:outerShdw blurRad="63500" dir="3600000" algn="tl" rotWithShape="0">
@@ -3209,35 +3881,660 @@
                   </a:srgbClr>
                 </a:outerShdw>
               </a:effectLst>
-              <a:latin typeface="Consolas"/>
-              <a:cs typeface="Consolas"/>
+              <a:latin typeface="Pokemon Solid Normal"/>
+              <a:cs typeface="Pokemon Solid Normal"/>
             </a:endParaRPr>
           </a:p>
         </p:txBody>
       </p:sp>
       <p:sp>
         <p:nvSpPr>
-          <p:cNvPr id="3" name="Subtitle 2"/>
-          <p:cNvSpPr>
-            <a:spLocks noGrp="1"/>
-          </p:cNvSpPr>
-          <p:nvPr>
-            <p:ph type="subTitle" idx="1"/>
-          </p:nvPr>
-        </p:nvSpPr>
-        <p:spPr/>
+          <p:cNvPr id="4" name="Content Placeholder 2"/>
+          <p:cNvSpPr txBox="1">
+            <a:spLocks/>
+          </p:cNvSpPr>
+          <p:nvPr/>
+        </p:nvSpPr>
+        <p:spPr>
+          <a:xfrm>
+            <a:off x="-832558" y="3612446"/>
+            <a:ext cx="3866445" cy="1665111"/>
+          </a:xfrm>
+          <a:prstGeom prst="rect">
+            <a:avLst/>
+          </a:prstGeom>
+          <a:solidFill>
+            <a:schemeClr val="lt1">
+              <a:alpha val="1000"/>
+            </a:schemeClr>
+          </a:solidFill>
+          <a:ln w="25400" cap="flat" cmpd="sng" algn="ctr">
+            <a:noFill/>
+            <a:prstDash val="solid"/>
+          </a:ln>
+          <a:effectLst/>
+        </p:spPr>
+        <p:txBody>
+          <a:bodyPr vert="horz" lIns="91440" tIns="45720" rIns="91440" bIns="45720" rtlCol="0">
+            <a:noAutofit/>
+          </a:bodyPr>
+          <a:lstStyle>
+            <a:lvl1pPr marL="0" indent="0" algn="ctr" defTabSz="457200" rtl="0" eaLnBrk="1" latinLnBrk="0" hangingPunct="1">
+              <a:spcBef>
+                <a:spcPct val="20000"/>
+              </a:spcBef>
+              <a:buFont typeface="Arial"/>
+              <a:buNone/>
+              <a:defRPr sz="3200" kern="1200">
+                <a:solidFill>
+                  <a:schemeClr val="tx1">
+                    <a:tint val="75000"/>
+                  </a:schemeClr>
+                </a:solidFill>
+                <a:latin typeface="+mn-lt"/>
+                <a:ea typeface="+mn-ea"/>
+                <a:cs typeface="+mn-cs"/>
+              </a:defRPr>
+            </a:lvl1pPr>
+            <a:lvl2pPr marL="457200" indent="0" algn="ctr" defTabSz="457200" rtl="0" eaLnBrk="1" latinLnBrk="0" hangingPunct="1">
+              <a:spcBef>
+                <a:spcPct val="20000"/>
+              </a:spcBef>
+              <a:buFont typeface="Arial"/>
+              <a:buNone/>
+              <a:defRPr sz="2800" kern="1200">
+                <a:solidFill>
+                  <a:schemeClr val="tx1">
+                    <a:tint val="75000"/>
+                  </a:schemeClr>
+                </a:solidFill>
+                <a:latin typeface="+mn-lt"/>
+                <a:ea typeface="+mn-ea"/>
+                <a:cs typeface="+mn-cs"/>
+              </a:defRPr>
+            </a:lvl2pPr>
+            <a:lvl3pPr marL="914400" indent="0" algn="ctr" defTabSz="457200" rtl="0" eaLnBrk="1" latinLnBrk="0" hangingPunct="1">
+              <a:spcBef>
+                <a:spcPct val="20000"/>
+              </a:spcBef>
+              <a:buFont typeface="Arial"/>
+              <a:buNone/>
+              <a:defRPr sz="2400" kern="1200">
+                <a:solidFill>
+                  <a:schemeClr val="tx1">
+                    <a:tint val="75000"/>
+                  </a:schemeClr>
+                </a:solidFill>
+                <a:latin typeface="+mn-lt"/>
+                <a:ea typeface="+mn-ea"/>
+                <a:cs typeface="+mn-cs"/>
+              </a:defRPr>
+            </a:lvl3pPr>
+            <a:lvl4pPr marL="1371600" indent="0" algn="ctr" defTabSz="457200" rtl="0" eaLnBrk="1" latinLnBrk="0" hangingPunct="1">
+              <a:spcBef>
+                <a:spcPct val="20000"/>
+              </a:spcBef>
+              <a:buFont typeface="Arial"/>
+              <a:buNone/>
+              <a:defRPr sz="2000" kern="1200">
+                <a:solidFill>
+                  <a:schemeClr val="tx1">
+                    <a:tint val="75000"/>
+                  </a:schemeClr>
+                </a:solidFill>
+                <a:latin typeface="+mn-lt"/>
+                <a:ea typeface="+mn-ea"/>
+                <a:cs typeface="+mn-cs"/>
+              </a:defRPr>
+            </a:lvl4pPr>
+            <a:lvl5pPr marL="1828800" indent="0" algn="ctr" defTabSz="457200" rtl="0" eaLnBrk="1" latinLnBrk="0" hangingPunct="1">
+              <a:spcBef>
+                <a:spcPct val="20000"/>
+              </a:spcBef>
+              <a:buFont typeface="Arial"/>
+              <a:buNone/>
+              <a:defRPr sz="2000" kern="1200">
+                <a:solidFill>
+                  <a:schemeClr val="tx1">
+                    <a:tint val="75000"/>
+                  </a:schemeClr>
+                </a:solidFill>
+                <a:latin typeface="+mn-lt"/>
+                <a:ea typeface="+mn-ea"/>
+                <a:cs typeface="+mn-cs"/>
+              </a:defRPr>
+            </a:lvl5pPr>
+            <a:lvl6pPr marL="2286000" indent="0" algn="ctr" defTabSz="457200" rtl="0" eaLnBrk="1" latinLnBrk="0" hangingPunct="1">
+              <a:spcBef>
+                <a:spcPct val="20000"/>
+              </a:spcBef>
+              <a:buFont typeface="Arial"/>
+              <a:buNone/>
+              <a:defRPr sz="2000" kern="1200">
+                <a:solidFill>
+                  <a:schemeClr val="tx1">
+                    <a:tint val="75000"/>
+                  </a:schemeClr>
+                </a:solidFill>
+                <a:latin typeface="+mn-lt"/>
+                <a:ea typeface="+mn-ea"/>
+                <a:cs typeface="+mn-cs"/>
+              </a:defRPr>
+            </a:lvl6pPr>
+            <a:lvl7pPr marL="2743200" indent="0" algn="ctr" defTabSz="457200" rtl="0" eaLnBrk="1" latinLnBrk="0" hangingPunct="1">
+              <a:spcBef>
+                <a:spcPct val="20000"/>
+              </a:spcBef>
+              <a:buFont typeface="Arial"/>
+              <a:buNone/>
+              <a:defRPr sz="2000" kern="1200">
+                <a:solidFill>
+                  <a:schemeClr val="tx1">
+                    <a:tint val="75000"/>
+                  </a:schemeClr>
+                </a:solidFill>
+                <a:latin typeface="+mn-lt"/>
+                <a:ea typeface="+mn-ea"/>
+                <a:cs typeface="+mn-cs"/>
+              </a:defRPr>
+            </a:lvl7pPr>
+            <a:lvl8pPr marL="3200400" indent="0" algn="ctr" defTabSz="457200" rtl="0" eaLnBrk="1" latinLnBrk="0" hangingPunct="1">
+              <a:spcBef>
+                <a:spcPct val="20000"/>
+              </a:spcBef>
+              <a:buFont typeface="Arial"/>
+              <a:buNone/>
+              <a:defRPr sz="2000" kern="1200">
+                <a:solidFill>
+                  <a:schemeClr val="tx1">
+                    <a:tint val="75000"/>
+                  </a:schemeClr>
+                </a:solidFill>
+                <a:latin typeface="+mn-lt"/>
+                <a:ea typeface="+mn-ea"/>
+                <a:cs typeface="+mn-cs"/>
+              </a:defRPr>
+            </a:lvl8pPr>
+            <a:lvl9pPr marL="3657600" indent="0" algn="ctr" defTabSz="457200" rtl="0" eaLnBrk="1" latinLnBrk="0" hangingPunct="1">
+              <a:spcBef>
+                <a:spcPct val="20000"/>
+              </a:spcBef>
+              <a:buFont typeface="Arial"/>
+              <a:buNone/>
+              <a:defRPr sz="2000" kern="1200">
+                <a:solidFill>
+                  <a:schemeClr val="tx1">
+                    <a:tint val="75000"/>
+                  </a:schemeClr>
+                </a:solidFill>
+                <a:latin typeface="+mn-lt"/>
+                <a:ea typeface="+mn-ea"/>
+                <a:cs typeface="+mn-cs"/>
+              </a:defRPr>
+            </a:lvl9pPr>
+          </a:lstStyle>
+          <a:p>
+            <a:r>
+              <a:rPr lang="en-US" sz="9600" dirty="0" smtClean="0">
+                <a:latin typeface="Pokemon pixels 1"/>
+                <a:cs typeface="Pokemon pixels 1"/>
+              </a:rPr>
+              <a:t>\</a:t>
+            </a:r>
+            <a:r>
+              <a:rPr lang="en-US" sz="9600" dirty="0" smtClean="0">
+                <a:solidFill>
+                  <a:schemeClr val="tx1"/>
+                </a:solidFill>
+                <a:latin typeface="Pokemon pixels 1"/>
+                <a:cs typeface="Pokemon pixels 1"/>
+              </a:rPr>
+              <a:t>8</a:t>
+            </a:r>
+            <a:endParaRPr lang="en-US" sz="9600" dirty="0" smtClean="0">
+              <a:solidFill>
+                <a:schemeClr val="tx1"/>
+              </a:solidFill>
+              <a:latin typeface="Pokemon pixels 1"/>
+              <a:cs typeface="Pokemon pixels 1"/>
+            </a:endParaRPr>
+          </a:p>
+        </p:txBody>
+      </p:sp>
+      <p:sp>
+        <p:nvSpPr>
+          <p:cNvPr id="5" name="Content Placeholder 2"/>
+          <p:cNvSpPr txBox="1">
+            <a:spLocks/>
+          </p:cNvSpPr>
+          <p:nvPr/>
+        </p:nvSpPr>
+        <p:spPr>
+          <a:xfrm>
+            <a:off x="5277555" y="434623"/>
+            <a:ext cx="3866445" cy="1665111"/>
+          </a:xfrm>
+          <a:prstGeom prst="rect">
+            <a:avLst/>
+          </a:prstGeom>
+          <a:solidFill>
+            <a:schemeClr val="lt1">
+              <a:alpha val="1000"/>
+            </a:schemeClr>
+          </a:solidFill>
+          <a:ln w="25400" cap="flat" cmpd="sng" algn="ctr">
+            <a:noFill/>
+            <a:prstDash val="solid"/>
+          </a:ln>
+          <a:effectLst/>
+        </p:spPr>
+        <p:txBody>
+          <a:bodyPr vert="horz" lIns="91440" tIns="45720" rIns="91440" bIns="45720" rtlCol="0">
+            <a:noAutofit/>
+          </a:bodyPr>
+          <a:lstStyle>
+            <a:lvl1pPr marL="0" indent="0" algn="ctr" defTabSz="457200" rtl="0" eaLnBrk="1" latinLnBrk="0" hangingPunct="1">
+              <a:spcBef>
+                <a:spcPct val="20000"/>
+              </a:spcBef>
+              <a:buFont typeface="Arial"/>
+              <a:buNone/>
+              <a:defRPr sz="3200" kern="1200">
+                <a:solidFill>
+                  <a:schemeClr val="tx1">
+                    <a:tint val="75000"/>
+                  </a:schemeClr>
+                </a:solidFill>
+                <a:latin typeface="+mn-lt"/>
+                <a:ea typeface="+mn-ea"/>
+                <a:cs typeface="+mn-cs"/>
+              </a:defRPr>
+            </a:lvl1pPr>
+            <a:lvl2pPr marL="457200" indent="0" algn="ctr" defTabSz="457200" rtl="0" eaLnBrk="1" latinLnBrk="0" hangingPunct="1">
+              <a:spcBef>
+                <a:spcPct val="20000"/>
+              </a:spcBef>
+              <a:buFont typeface="Arial"/>
+              <a:buNone/>
+              <a:defRPr sz="2800" kern="1200">
+                <a:solidFill>
+                  <a:schemeClr val="tx1">
+                    <a:tint val="75000"/>
+                  </a:schemeClr>
+                </a:solidFill>
+                <a:latin typeface="+mn-lt"/>
+                <a:ea typeface="+mn-ea"/>
+                <a:cs typeface="+mn-cs"/>
+              </a:defRPr>
+            </a:lvl2pPr>
+            <a:lvl3pPr marL="914400" indent="0" algn="ctr" defTabSz="457200" rtl="0" eaLnBrk="1" latinLnBrk="0" hangingPunct="1">
+              <a:spcBef>
+                <a:spcPct val="20000"/>
+              </a:spcBef>
+              <a:buFont typeface="Arial"/>
+              <a:buNone/>
+              <a:defRPr sz="2400" kern="1200">
+                <a:solidFill>
+                  <a:schemeClr val="tx1">
+                    <a:tint val="75000"/>
+                  </a:schemeClr>
+                </a:solidFill>
+                <a:latin typeface="+mn-lt"/>
+                <a:ea typeface="+mn-ea"/>
+                <a:cs typeface="+mn-cs"/>
+              </a:defRPr>
+            </a:lvl3pPr>
+            <a:lvl4pPr marL="1371600" indent="0" algn="ctr" defTabSz="457200" rtl="0" eaLnBrk="1" latinLnBrk="0" hangingPunct="1">
+              <a:spcBef>
+                <a:spcPct val="20000"/>
+              </a:spcBef>
+              <a:buFont typeface="Arial"/>
+              <a:buNone/>
+              <a:defRPr sz="2000" kern="1200">
+                <a:solidFill>
+                  <a:schemeClr val="tx1">
+                    <a:tint val="75000"/>
+                  </a:schemeClr>
+                </a:solidFill>
+                <a:latin typeface="+mn-lt"/>
+                <a:ea typeface="+mn-ea"/>
+                <a:cs typeface="+mn-cs"/>
+              </a:defRPr>
+            </a:lvl4pPr>
+            <a:lvl5pPr marL="1828800" indent="0" algn="ctr" defTabSz="457200" rtl="0" eaLnBrk="1" latinLnBrk="0" hangingPunct="1">
+              <a:spcBef>
+                <a:spcPct val="20000"/>
+              </a:spcBef>
+              <a:buFont typeface="Arial"/>
+              <a:buNone/>
+              <a:defRPr sz="2000" kern="1200">
+                <a:solidFill>
+                  <a:schemeClr val="tx1">
+                    <a:tint val="75000"/>
+                  </a:schemeClr>
+                </a:solidFill>
+                <a:latin typeface="+mn-lt"/>
+                <a:ea typeface="+mn-ea"/>
+                <a:cs typeface="+mn-cs"/>
+              </a:defRPr>
+            </a:lvl5pPr>
+            <a:lvl6pPr marL="2286000" indent="0" algn="ctr" defTabSz="457200" rtl="0" eaLnBrk="1" latinLnBrk="0" hangingPunct="1">
+              <a:spcBef>
+                <a:spcPct val="20000"/>
+              </a:spcBef>
+              <a:buFont typeface="Arial"/>
+              <a:buNone/>
+              <a:defRPr sz="2000" kern="1200">
+                <a:solidFill>
+                  <a:schemeClr val="tx1">
+                    <a:tint val="75000"/>
+                  </a:schemeClr>
+                </a:solidFill>
+                <a:latin typeface="+mn-lt"/>
+                <a:ea typeface="+mn-ea"/>
+                <a:cs typeface="+mn-cs"/>
+              </a:defRPr>
+            </a:lvl6pPr>
+            <a:lvl7pPr marL="2743200" indent="0" algn="ctr" defTabSz="457200" rtl="0" eaLnBrk="1" latinLnBrk="0" hangingPunct="1">
+              <a:spcBef>
+                <a:spcPct val="20000"/>
+              </a:spcBef>
+              <a:buFont typeface="Arial"/>
+              <a:buNone/>
+              <a:defRPr sz="2000" kern="1200">
+                <a:solidFill>
+                  <a:schemeClr val="tx1">
+                    <a:tint val="75000"/>
+                  </a:schemeClr>
+                </a:solidFill>
+                <a:latin typeface="+mn-lt"/>
+                <a:ea typeface="+mn-ea"/>
+                <a:cs typeface="+mn-cs"/>
+              </a:defRPr>
+            </a:lvl7pPr>
+            <a:lvl8pPr marL="3200400" indent="0" algn="ctr" defTabSz="457200" rtl="0" eaLnBrk="1" latinLnBrk="0" hangingPunct="1">
+              <a:spcBef>
+                <a:spcPct val="20000"/>
+              </a:spcBef>
+              <a:buFont typeface="Arial"/>
+              <a:buNone/>
+              <a:defRPr sz="2000" kern="1200">
+                <a:solidFill>
+                  <a:schemeClr val="tx1">
+                    <a:tint val="75000"/>
+                  </a:schemeClr>
+                </a:solidFill>
+                <a:latin typeface="+mn-lt"/>
+                <a:ea typeface="+mn-ea"/>
+                <a:cs typeface="+mn-cs"/>
+              </a:defRPr>
+            </a:lvl8pPr>
+            <a:lvl9pPr marL="3657600" indent="0" algn="ctr" defTabSz="457200" rtl="0" eaLnBrk="1" latinLnBrk="0" hangingPunct="1">
+              <a:spcBef>
+                <a:spcPct val="20000"/>
+              </a:spcBef>
+              <a:buFont typeface="Arial"/>
+              <a:buNone/>
+              <a:defRPr sz="2000" kern="1200">
+                <a:solidFill>
+                  <a:schemeClr val="tx1">
+                    <a:tint val="75000"/>
+                  </a:schemeClr>
+                </a:solidFill>
+                <a:latin typeface="+mn-lt"/>
+                <a:ea typeface="+mn-ea"/>
+                <a:cs typeface="+mn-cs"/>
+              </a:defRPr>
+            </a:lvl9pPr>
+          </a:lstStyle>
+          <a:p>
+            <a:r>
+              <a:rPr lang="en-US" sz="9600" dirty="0">
+                <a:solidFill>
+                  <a:srgbClr val="000000"/>
+                </a:solidFill>
+                <a:latin typeface="Pokemon pixels 1"/>
+                <a:cs typeface="Pokemon pixels 1"/>
+              </a:rPr>
+              <a:t>n</a:t>
+            </a:r>
+            <a:endParaRPr lang="en-US" sz="9600" dirty="0" smtClean="0">
+              <a:solidFill>
+                <a:srgbClr val="000000"/>
+              </a:solidFill>
+              <a:latin typeface="Pokemon pixels 1"/>
+              <a:cs typeface="Pokemon pixels 1"/>
+            </a:endParaRPr>
+          </a:p>
+        </p:txBody>
+      </p:sp>
+      <p:sp>
+        <p:nvSpPr>
+          <p:cNvPr id="8" name="Round Diagonal Corner Rectangle 7"/>
+          <p:cNvSpPr/>
+          <p:nvPr/>
+        </p:nvSpPr>
+        <p:spPr>
+          <a:xfrm>
+            <a:off x="263032" y="632741"/>
+            <a:ext cx="4596835" cy="1159370"/>
+          </a:xfrm>
+          <a:prstGeom prst="round2DiagRect">
+            <a:avLst>
+              <a:gd name="adj1" fmla="val 50000"/>
+              <a:gd name="adj2" fmla="val 0"/>
+            </a:avLst>
+          </a:prstGeom>
+          <a:solidFill>
+            <a:srgbClr val="FFFFB3"/>
+          </a:solidFill>
+          <a:ln w="28575">
+            <a:solidFill>
+              <a:schemeClr val="tx1"/>
+            </a:solidFill>
+          </a:ln>
+          <a:effectLst/>
+        </p:spPr>
+        <p:style>
+          <a:lnRef idx="1">
+            <a:schemeClr val="accent1"/>
+          </a:lnRef>
+          <a:fillRef idx="3">
+            <a:schemeClr val="accent1"/>
+          </a:fillRef>
+          <a:effectRef idx="2">
+            <a:schemeClr val="accent1"/>
+          </a:effectRef>
+          <a:fontRef idx="minor">
+            <a:schemeClr val="lt1"/>
+          </a:fontRef>
+        </p:style>
         <p:txBody>
           <a:bodyPr/>
           <a:lstStyle/>
           <a:p>
-            <a:r>
-              <a:rPr lang="en-US" dirty="0" smtClean="0"/>
-              <a:t>The best team</a:t>
-            </a:r>
             <a:endParaRPr lang="en-US" dirty="0"/>
           </a:p>
         </p:txBody>
       </p:sp>
+      <p:sp>
+        <p:nvSpPr>
+          <p:cNvPr id="12" name="TextBox 11"/>
+          <p:cNvSpPr txBox="1"/>
+          <p:nvPr/>
+        </p:nvSpPr>
+        <p:spPr>
+          <a:xfrm>
+            <a:off x="685800" y="832556"/>
+            <a:ext cx="1995311" cy="461665"/>
+          </a:xfrm>
+          <a:prstGeom prst="rect">
+            <a:avLst/>
+          </a:prstGeom>
+          <a:noFill/>
+        </p:spPr>
+        <p:txBody>
+          <a:bodyPr wrap="square" rtlCol="0">
+            <a:spAutoFit/>
+          </a:bodyPr>
+          <a:lstStyle/>
+          <a:p>
+            <a:r>
+              <a:rPr lang="en-US" sz="2400" dirty="0" smtClean="0">
+                <a:latin typeface="Arial Narrow"/>
+                <a:cs typeface="Arial Narrow"/>
+              </a:rPr>
+              <a:t>WILCZYNSKI</a:t>
+            </a:r>
+            <a:endParaRPr lang="en-US" dirty="0"/>
+          </a:p>
+        </p:txBody>
+      </p:sp>
+      <p:sp>
+        <p:nvSpPr>
+          <p:cNvPr id="13" name="TextBox 12"/>
+          <p:cNvSpPr txBox="1"/>
+          <p:nvPr/>
+        </p:nvSpPr>
+        <p:spPr>
+          <a:xfrm>
+            <a:off x="3725334" y="857956"/>
+            <a:ext cx="813366" cy="461665"/>
+          </a:xfrm>
+          <a:prstGeom prst="rect">
+            <a:avLst/>
+          </a:prstGeom>
+          <a:noFill/>
+        </p:spPr>
+        <p:txBody>
+          <a:bodyPr wrap="square" rtlCol="0">
+            <a:spAutoFit/>
+          </a:bodyPr>
+          <a:lstStyle/>
+          <a:p>
+            <a:r>
+              <a:rPr lang="en-US" sz="2400" dirty="0" smtClean="0">
+                <a:latin typeface="Arial Narrow"/>
+                <a:cs typeface="Arial Narrow"/>
+              </a:rPr>
+              <a:t>Lv5</a:t>
+            </a:r>
+            <a:endParaRPr lang="en-US" dirty="0"/>
+          </a:p>
+        </p:txBody>
+      </p:sp>
+      <p:sp>
+        <p:nvSpPr>
+          <p:cNvPr id="14" name="TextBox 13"/>
+          <p:cNvSpPr txBox="1"/>
+          <p:nvPr/>
+        </p:nvSpPr>
+        <p:spPr>
+          <a:xfrm>
+            <a:off x="4845756" y="4047067"/>
+            <a:ext cx="1995311" cy="461665"/>
+          </a:xfrm>
+          <a:prstGeom prst="rect">
+            <a:avLst/>
+          </a:prstGeom>
+          <a:noFill/>
+        </p:spPr>
+        <p:txBody>
+          <a:bodyPr wrap="square" rtlCol="0">
+            <a:spAutoFit/>
+          </a:bodyPr>
+          <a:lstStyle/>
+          <a:p>
+            <a:r>
+              <a:rPr lang="en-US" sz="2400" dirty="0" smtClean="0">
+                <a:latin typeface="Arial Narrow"/>
+                <a:cs typeface="Arial Narrow"/>
+              </a:rPr>
+              <a:t>CROWLEY</a:t>
+            </a:r>
+            <a:endParaRPr lang="en-US" dirty="0"/>
+          </a:p>
+        </p:txBody>
+      </p:sp>
+      <p:sp>
+        <p:nvSpPr>
+          <p:cNvPr id="15" name="TextBox 14"/>
+          <p:cNvSpPr txBox="1"/>
+          <p:nvPr/>
+        </p:nvSpPr>
+        <p:spPr>
+          <a:xfrm>
+            <a:off x="7885290" y="4072467"/>
+            <a:ext cx="813366" cy="461665"/>
+          </a:xfrm>
+          <a:prstGeom prst="rect">
+            <a:avLst/>
+          </a:prstGeom>
+          <a:noFill/>
+        </p:spPr>
+        <p:txBody>
+          <a:bodyPr wrap="square" rtlCol="0">
+            <a:spAutoFit/>
+          </a:bodyPr>
+          <a:lstStyle/>
+          <a:p>
+            <a:r>
+              <a:rPr lang="en-US" sz="2400" dirty="0" smtClean="0">
+                <a:latin typeface="Arial Narrow"/>
+                <a:cs typeface="Arial Narrow"/>
+              </a:rPr>
+              <a:t>Lv6</a:t>
+            </a:r>
+            <a:endParaRPr lang="en-US" dirty="0"/>
+          </a:p>
+        </p:txBody>
+      </p:sp>
+      <p:pic>
+        <p:nvPicPr>
+          <p:cNvPr id="16" name="Picture 15"/>
+          <p:cNvPicPr>
+            <a:picLocks noChangeAspect="1"/>
+          </p:cNvPicPr>
+          <p:nvPr/>
+        </p:nvPicPr>
+        <p:blipFill rotWithShape="1">
+          <a:blip r:embed="rId2"/>
+          <a:srcRect l="5125" t="31729" r="63907" b="66525"/>
+          <a:stretch/>
+        </p:blipFill>
+        <p:spPr>
+          <a:xfrm>
+            <a:off x="685800" y="1396162"/>
+            <a:ext cx="3011312" cy="254292"/>
+          </a:xfrm>
+          <a:prstGeom prst="rect">
+            <a:avLst/>
+          </a:prstGeom>
+        </p:spPr>
+      </p:pic>
+      <p:pic>
+        <p:nvPicPr>
+          <p:cNvPr id="18" name="Picture 17"/>
+          <p:cNvPicPr>
+            <a:picLocks noChangeAspect="1"/>
+          </p:cNvPicPr>
+          <p:nvPr/>
+        </p:nvPicPr>
+        <p:blipFill rotWithShape="1">
+          <a:blip r:embed="rId2"/>
+          <a:srcRect l="5125" t="31729" r="63907" b="66525"/>
+          <a:stretch/>
+        </p:blipFill>
+        <p:spPr>
+          <a:xfrm>
+            <a:off x="4859867" y="4561808"/>
+            <a:ext cx="3011312" cy="254292"/>
+          </a:xfrm>
+          <a:prstGeom prst="rect">
+            <a:avLst/>
+          </a:prstGeom>
+        </p:spPr>
+      </p:pic>
     </p:spTree>
     <p:extLst>
       <p:ext uri="{BB962C8B-B14F-4D97-AF65-F5344CB8AC3E}">
@@ -3292,14 +4589,17 @@
           <a:p>
             <a:r>
               <a:rPr lang="en-US" dirty="0" smtClean="0">
-                <a:ln w="18415" cmpd="sng">
+                <a:ln w="21590" cmpd="sng">
                   <a:solidFill>
-                    <a:srgbClr val="FFFFFF"/>
+                    <a:schemeClr val="tx2">
+                      <a:lumMod val="60000"/>
+                      <a:lumOff val="40000"/>
+                    </a:schemeClr>
                   </a:solidFill>
                   <a:prstDash val="solid"/>
                 </a:ln>
                 <a:solidFill>
-                  <a:srgbClr val="FFFFFF"/>
+                  <a:srgbClr val="FFFF00"/>
                 </a:solidFill>
                 <a:effectLst>
                   <a:outerShdw blurRad="63500" dir="3600000" algn="tl" rotWithShape="0">
@@ -3308,18 +4608,23 @@
                     </a:srgbClr>
                   </a:outerShdw>
                 </a:effectLst>
+                <a:latin typeface="Pokemon Solid Normal"/>
+                <a:cs typeface="Pokemon Solid Normal"/>
               </a:rPr>
               <a:t>What was interesting</a:t>
             </a:r>
             <a:endParaRPr lang="en-US" dirty="0">
-              <a:ln w="18415" cmpd="sng">
-                <a:solidFill>
-                  <a:srgbClr val="FFFFFF"/>
+              <a:ln w="21590" cmpd="sng">
+                <a:solidFill>
+                  <a:schemeClr val="tx2">
+                    <a:lumMod val="60000"/>
+                    <a:lumOff val="40000"/>
+                  </a:schemeClr>
                 </a:solidFill>
                 <a:prstDash val="solid"/>
               </a:ln>
               <a:solidFill>
-                <a:srgbClr val="FFFFFF"/>
+                <a:srgbClr val="FFFF00"/>
               </a:solidFill>
               <a:effectLst>
                 <a:outerShdw blurRad="63500" dir="3600000" algn="tl" rotWithShape="0">
@@ -3328,6 +4633,8 @@
                   </a:srgbClr>
                 </a:outerShdw>
               </a:effectLst>
+              <a:latin typeface="Pokemon Solid Normal"/>
+              <a:cs typeface="Pokemon Solid Normal"/>
             </a:endParaRPr>
           </a:p>
         </p:txBody>
@@ -3349,75 +4656,84 @@
           <a:p>
             <a:r>
               <a:rPr lang="en-US" dirty="0" smtClean="0"/>
-              <a:t>Team work</a:t>
-            </a:r>
-          </a:p>
-          <a:p>
+              <a:t>Potential of swing</a:t>
+            </a:r>
+          </a:p>
+          <a:p>
+            <a:pPr lvl="1"/>
             <a:r>
               <a:rPr lang="en-US" dirty="0" smtClean="0"/>
-              <a:t>Sever-client</a:t>
+              <a:t>Transparent panels</a:t>
             </a:r>
           </a:p>
           <a:p>
             <a:r>
               <a:rPr lang="en-US" dirty="0" smtClean="0"/>
-              <a:t>Peter’s Thai obsession</a:t>
-            </a:r>
-          </a:p>
-          <a:p>
-            <a:r>
-              <a:rPr lang="en-US" dirty="0" err="1" smtClean="0"/>
-              <a:t>Neetu’s</a:t>
-            </a:r>
+              <a:t>Finished product</a:t>
+            </a:r>
+          </a:p>
+          <a:p>
             <a:r>
               <a:rPr lang="en-US" dirty="0" smtClean="0"/>
-              <a:t> drawings</a:t>
+              <a:t>Architecture</a:t>
             </a:r>
           </a:p>
           <a:p>
             <a:r>
               <a:rPr lang="en-US" dirty="0" smtClean="0"/>
-              <a:t>Shay’s personality</a:t>
-            </a:r>
-          </a:p>
-          <a:p>
-            <a:r>
-              <a:rPr lang="en-US" dirty="0" smtClean="0"/>
-              <a:t>Harry’s childhood</a:t>
-            </a:r>
-          </a:p>
-        </p:txBody>
-      </p:sp>
-      <p:pic>
-        <p:nvPicPr>
-          <p:cNvPr id="4" name="Picture 3"/>
-          <p:cNvPicPr>
-            <a:picLocks noChangeAspect="1"/>
-          </p:cNvPicPr>
-          <p:nvPr/>
-        </p:nvPicPr>
-        <p:blipFill>
-          <a:blip r:embed="rId2"/>
-          <a:stretch>
-            <a:fillRect/>
-          </a:stretch>
-        </p:blipFill>
+              <a:t>Implementation of other groups</a:t>
+            </a:r>
+            <a:endParaRPr lang="en-US" dirty="0" smtClean="0"/>
+          </a:p>
+          <a:p>
+            <a:endParaRPr lang="en-US" dirty="0" smtClean="0"/>
+          </a:p>
+        </p:txBody>
+      </p:sp>
+      <p:sp>
+        <p:nvSpPr>
+          <p:cNvPr id="5" name="Content Placeholder 2"/>
+          <p:cNvSpPr>
+            <a:spLocks noGrp="1"/>
+          </p:cNvSpPr>
+          <p:nvPr>
+            <p:ph sz="half" idx="1"/>
+          </p:nvPr>
+        </p:nvSpPr>
         <p:spPr>
           <a:xfrm>
-            <a:off x="5618581" y="1459056"/>
-            <a:ext cx="2640267" cy="5482659"/>
+            <a:off x="5105400" y="2841979"/>
+            <a:ext cx="4038600" cy="1899356"/>
           </a:xfrm>
-          <a:prstGeom prst="rect">
-            <a:avLst/>
-          </a:prstGeom>
-          <a:ln>
-            <a:noFill/>
-          </a:ln>
-          <a:effectLst>
-            <a:softEdge rad="112500"/>
-          </a:effectLst>
+          <a:solidFill>
+            <a:schemeClr val="lt1">
+              <a:alpha val="0"/>
+            </a:schemeClr>
+          </a:solidFill>
         </p:spPr>
-      </p:pic>
+        <p:txBody>
+          <a:bodyPr>
+            <a:noAutofit/>
+          </a:bodyPr>
+          <a:lstStyle/>
+          <a:p>
+            <a:pPr marL="0" indent="0" algn="ctr">
+              <a:buNone/>
+            </a:pPr>
+            <a:r>
+              <a:rPr lang="en-US" sz="15000" dirty="0" smtClean="0">
+                <a:latin typeface="Pokemon pixels 1"/>
+                <a:cs typeface="Pokemon pixels 1"/>
+              </a:rPr>
+              <a:t>f</a:t>
+            </a:r>
+            <a:endParaRPr lang="en-US" sz="15000" dirty="0" smtClean="0">
+              <a:latin typeface="Pokemon pixels 1"/>
+              <a:cs typeface="Pokemon pixels 1"/>
+            </a:endParaRPr>
+          </a:p>
+        </p:txBody>
+      </p:sp>
     </p:spTree>
     <p:extLst>
       <p:ext uri="{BB962C8B-B14F-4D97-AF65-F5344CB8AC3E}">
@@ -3457,29 +4773,150 @@
       </p:grpSpPr>
       <p:sp>
         <p:nvSpPr>
-          <p:cNvPr id="4" name="Title 3"/>
-          <p:cNvSpPr>
-            <a:spLocks noGrp="1"/>
-          </p:cNvSpPr>
-          <p:nvPr>
-            <p:ph type="title"/>
-          </p:nvPr>
-        </p:nvSpPr>
-        <p:spPr/>
+          <p:cNvPr id="5" name="Content Placeholder 4"/>
+          <p:cNvSpPr>
+            <a:spLocks noGrp="1"/>
+          </p:cNvSpPr>
+          <p:nvPr>
+            <p:ph sz="half" idx="1"/>
+          </p:nvPr>
+        </p:nvSpPr>
+        <p:spPr>
+          <a:xfrm>
+            <a:off x="457200" y="1586089"/>
+            <a:ext cx="4038600" cy="4525963"/>
+          </a:xfrm>
+        </p:spPr>
         <p:txBody>
           <a:bodyPr/>
           <a:lstStyle/>
           <a:p>
             <a:r>
+              <a:rPr lang="en-US" dirty="0" smtClean="0"/>
+              <a:t>Collaboration </a:t>
+            </a:r>
+          </a:p>
+          <a:p>
+            <a:r>
+              <a:rPr lang="en-US" dirty="0" smtClean="0"/>
+              <a:t>Great use of issue tracker</a:t>
+            </a:r>
+          </a:p>
+          <a:p>
+            <a:r>
+              <a:rPr lang="en-US" dirty="0" smtClean="0"/>
+              <a:t>True object oriented programming</a:t>
+            </a:r>
+          </a:p>
+          <a:p>
+            <a:r>
+              <a:rPr lang="en-US" dirty="0" smtClean="0"/>
+              <a:t>Architecture</a:t>
+            </a:r>
+          </a:p>
+          <a:p>
+            <a:endParaRPr lang="en-US" dirty="0" smtClean="0"/>
+          </a:p>
+          <a:p>
+            <a:endParaRPr lang="en-US" dirty="0" smtClean="0"/>
+          </a:p>
+          <a:p>
+            <a:endParaRPr lang="en-US" dirty="0"/>
+          </a:p>
+        </p:txBody>
+      </p:sp>
+      <p:sp>
+        <p:nvSpPr>
+          <p:cNvPr id="6" name="Content Placeholder 2"/>
+          <p:cNvSpPr>
+            <a:spLocks noGrp="1"/>
+          </p:cNvSpPr>
+          <p:nvPr>
+            <p:ph sz="half" idx="1"/>
+          </p:nvPr>
+        </p:nvSpPr>
+        <p:spPr>
+          <a:xfrm>
+            <a:off x="5105400" y="2841979"/>
+            <a:ext cx="4038600" cy="1899356"/>
+          </a:xfrm>
+          <a:solidFill>
+            <a:schemeClr val="lt1">
+              <a:alpha val="0"/>
+            </a:schemeClr>
+          </a:solidFill>
+        </p:spPr>
+        <p:txBody>
+          <a:bodyPr>
+            <a:noAutofit/>
+          </a:bodyPr>
+          <a:lstStyle/>
+          <a:p>
+            <a:pPr marL="0" indent="0" algn="ctr">
+              <a:buNone/>
+            </a:pPr>
+            <a:r>
+              <a:rPr lang="en-US" sz="15000" dirty="0" smtClean="0">
+                <a:latin typeface="Pokemon pixels 1"/>
+                <a:cs typeface="Pokemon pixels 1"/>
+              </a:rPr>
+              <a:t>b</a:t>
+            </a:r>
+            <a:endParaRPr lang="en-US" sz="15000" dirty="0" smtClean="0">
+              <a:latin typeface="Pokemon pixels 1"/>
+              <a:cs typeface="Pokemon pixels 1"/>
+            </a:endParaRPr>
+          </a:p>
+        </p:txBody>
+      </p:sp>
+      <p:sp>
+        <p:nvSpPr>
+          <p:cNvPr id="8" name="Title 1"/>
+          <p:cNvSpPr txBox="1">
+            <a:spLocks/>
+          </p:cNvSpPr>
+          <p:nvPr/>
+        </p:nvSpPr>
+        <p:spPr>
+          <a:xfrm>
+            <a:off x="609600" y="328261"/>
+            <a:ext cx="8229600" cy="1143000"/>
+          </a:xfrm>
+          <a:prstGeom prst="rect">
+            <a:avLst/>
+          </a:prstGeom>
+        </p:spPr>
+        <p:txBody>
+          <a:bodyPr vert="horz" lIns="91440" tIns="45720" rIns="91440" bIns="45720" rtlCol="0" anchor="ctr">
+            <a:noAutofit/>
+          </a:bodyPr>
+          <a:lstStyle>
+            <a:lvl1pPr algn="ctr" defTabSz="457200" rtl="0" eaLnBrk="1" latinLnBrk="0" hangingPunct="1">
+              <a:spcBef>
+                <a:spcPct val="0"/>
+              </a:spcBef>
+              <a:buNone/>
+              <a:defRPr sz="4000" kern="1200">
+                <a:solidFill>
+                  <a:schemeClr val="tx1"/>
+                </a:solidFill>
+                <a:latin typeface="Andale Mono"/>
+                <a:ea typeface="+mj-ea"/>
+                <a:cs typeface="Andale Mono"/>
+              </a:defRPr>
+            </a:lvl1pPr>
+          </a:lstStyle>
+          <a:p>
+            <a:r>
               <a:rPr lang="en-US" dirty="0" smtClean="0">
-                <a:ln w="18415" cmpd="sng">
+                <a:ln w="21590" cmpd="sng">
                   <a:solidFill>
-                    <a:srgbClr val="FFFFFF"/>
+                    <a:srgbClr val="558ED5"/>
                   </a:solidFill>
                   <a:prstDash val="solid"/>
                 </a:ln>
                 <a:solidFill>
-                  <a:srgbClr val="FFFFFF"/>
+                  <a:srgbClr val="FFFF00"/>
                 </a:solidFill>
                 <a:effectLst>
                   <a:outerShdw blurRad="63500" dir="3600000" algn="tl" rotWithShape="0">
@@ -3488,18 +4925,20 @@
                     </a:srgbClr>
                   </a:outerShdw>
                 </a:effectLst>
+                <a:latin typeface="Pokemon Solid Normal"/>
+                <a:cs typeface="Pokemon Solid Normal"/>
               </a:rPr>
-              <a:t>What worked?</a:t>
+              <a:t>What Worked</a:t>
             </a:r>
             <a:endParaRPr lang="en-US" dirty="0">
-              <a:ln w="18415" cmpd="sng">
-                <a:solidFill>
-                  <a:srgbClr val="FFFFFF"/>
+              <a:ln w="21590" cmpd="sng">
+                <a:solidFill>
+                  <a:srgbClr val="558ED5"/>
                 </a:solidFill>
                 <a:prstDash val="solid"/>
               </a:ln>
               <a:solidFill>
-                <a:srgbClr val="FFFFFF"/>
+                <a:srgbClr val="FFFF00"/>
               </a:solidFill>
               <a:effectLst>
                 <a:outerShdw blurRad="63500" dir="3600000" algn="tl" rotWithShape="0">
@@ -3508,67 +4947,12 @@
                   </a:srgbClr>
                 </a:outerShdw>
               </a:effectLst>
+              <a:latin typeface="Pokemon Solid Normal"/>
+              <a:cs typeface="Pokemon Solid Normal"/>
             </a:endParaRPr>
           </a:p>
         </p:txBody>
       </p:sp>
-      <p:sp>
-        <p:nvSpPr>
-          <p:cNvPr id="5" name="Content Placeholder 4"/>
-          <p:cNvSpPr>
-            <a:spLocks noGrp="1"/>
-          </p:cNvSpPr>
-          <p:nvPr>
-            <p:ph sz="half" idx="1"/>
-          </p:nvPr>
-        </p:nvSpPr>
-        <p:spPr>
-          <a:xfrm>
-            <a:off x="457200" y="1586089"/>
-            <a:ext cx="4038600" cy="4525963"/>
-          </a:xfrm>
-        </p:spPr>
-        <p:txBody>
-          <a:bodyPr/>
-          <a:lstStyle/>
-          <a:p>
-            <a:r>
-              <a:rPr lang="en-US" dirty="0" smtClean="0"/>
-              <a:t>Everything went perfectly</a:t>
-            </a:r>
-            <a:endParaRPr lang="en-US" dirty="0"/>
-          </a:p>
-        </p:txBody>
-      </p:sp>
-      <p:pic>
-        <p:nvPicPr>
-          <p:cNvPr id="7" name="Content Placeholder 6"/>
-          <p:cNvPicPr>
-            <a:picLocks noGrp="1" noChangeAspect="1"/>
-          </p:cNvPicPr>
-          <p:nvPr>
-            <p:ph sz="half" idx="2"/>
-          </p:nvPr>
-        </p:nvPicPr>
-        <p:blipFill>
-          <a:blip r:embed="rId2"/>
-          <a:srcRect t="7975" b="7975"/>
-          <a:stretch>
-            <a:fillRect/>
-          </a:stretch>
-        </p:blipFill>
-        <p:spPr>
-          <a:prstGeom prst="rect">
-            <a:avLst/>
-          </a:prstGeom>
-          <a:ln>
-            <a:noFill/>
-          </a:ln>
-          <a:effectLst>
-            <a:softEdge rad="112500"/>
-          </a:effectLst>
-        </p:spPr>
-      </p:pic>
     </p:spTree>
     <p:extLst>
       <p:ext uri="{BB962C8B-B14F-4D97-AF65-F5344CB8AC3E}">
@@ -3579,6 +4963,13 @@
   <p:clrMapOvr>
     <a:masterClrMapping/>
   </p:clrMapOvr>
+  <p:timing>
+    <p:tnLst>
+      <p:par>
+        <p:cTn xmlns:p14="http://schemas.microsoft.com/office/powerpoint/2010/main" id="1" dur="indefinite" restart="never" nodeType="tmRoot"/>
+      </p:par>
+    </p:tnLst>
+  </p:timing>
 </p:sld>
 </file>
 
@@ -3616,14 +5007,14 @@
           <a:p>
             <a:r>
               <a:rPr lang="en-US" dirty="0" smtClean="0">
-                <a:ln w="18415" cmpd="sng">
+                <a:ln w="21590" cmpd="sng">
                   <a:solidFill>
-                    <a:srgbClr val="FFFFFF"/>
+                    <a:srgbClr val="558ED5"/>
                   </a:solidFill>
                   <a:prstDash val="solid"/>
                 </a:ln>
                 <a:solidFill>
-                  <a:srgbClr val="FFFFFF"/>
+                  <a:srgbClr val="FFFF00"/>
                 </a:solidFill>
                 <a:effectLst>
                   <a:outerShdw blurRad="63500" dir="3600000" algn="tl" rotWithShape="0">
@@ -3632,18 +5023,20 @@
                     </a:srgbClr>
                   </a:outerShdw>
                 </a:effectLst>
+                <a:latin typeface="Pokemon Solid Normal"/>
+                <a:cs typeface="Pokemon Solid Normal"/>
               </a:rPr>
-              <a:t>What didn’t work</a:t>
+              <a:t>What didn’t Work</a:t>
             </a:r>
             <a:endParaRPr lang="en-US" dirty="0">
-              <a:ln w="18415" cmpd="sng">
-                <a:solidFill>
-                  <a:srgbClr val="FFFFFF"/>
+              <a:ln w="21590" cmpd="sng">
+                <a:solidFill>
+                  <a:srgbClr val="558ED5"/>
                 </a:solidFill>
                 <a:prstDash val="solid"/>
               </a:ln>
               <a:solidFill>
-                <a:srgbClr val="FFFFFF"/>
+                <a:srgbClr val="FFFF00"/>
               </a:solidFill>
               <a:effectLst>
                 <a:outerShdw blurRad="63500" dir="3600000" algn="tl" rotWithShape="0">
@@ -3652,6 +5045,8 @@
                   </a:srgbClr>
                 </a:outerShdw>
               </a:effectLst>
+              <a:latin typeface="Pokemon Solid Normal"/>
+              <a:cs typeface="Pokemon Solid Normal"/>
             </a:endParaRPr>
           </a:p>
         </p:txBody>
@@ -3673,31 +5068,212 @@
           <a:p>
             <a:r>
               <a:rPr lang="en-US" dirty="0" smtClean="0"/>
-              <a:t>Nothing</a:t>
+              <a:t>Non-mandatory meetings</a:t>
+            </a:r>
+          </a:p>
+          <a:p>
+            <a:pPr lvl="1"/>
+            <a:r>
+              <a:rPr lang="en-US" dirty="0" smtClean="0"/>
+              <a:t>Quick fix: must attend 80% of meetings</a:t>
+            </a:r>
+          </a:p>
+          <a:p>
+            <a:r>
+              <a:rPr lang="en-US" dirty="0" smtClean="0"/>
+              <a:t>Great Wiki</a:t>
             </a:r>
             <a:endParaRPr lang="en-US" dirty="0"/>
           </a:p>
         </p:txBody>
       </p:sp>
-      <p:pic>
-        <p:nvPicPr>
-          <p:cNvPr id="5" name="Content Placeholder 4"/>
-          <p:cNvPicPr>
-            <a:picLocks noGrp="1" noChangeAspect="1"/>
-          </p:cNvPicPr>
-          <p:nvPr>
-            <p:ph sz="half" idx="2"/>
-          </p:nvPr>
-        </p:nvPicPr>
-        <p:blipFill>
-          <a:blip r:embed="rId2"/>
-          <a:srcRect l="20816" r="20816"/>
-          <a:stretch>
-            <a:fillRect/>
-          </a:stretch>
-        </p:blipFill>
-        <p:spPr/>
-      </p:pic>
+      <p:sp>
+        <p:nvSpPr>
+          <p:cNvPr id="6" name="Content Placeholder 2"/>
+          <p:cNvSpPr txBox="1">
+            <a:spLocks/>
+          </p:cNvSpPr>
+          <p:nvPr/>
+        </p:nvSpPr>
+        <p:spPr>
+          <a:xfrm>
+            <a:off x="5105400" y="2841979"/>
+            <a:ext cx="4038600" cy="1899356"/>
+          </a:xfrm>
+          <a:prstGeom prst="rect">
+            <a:avLst/>
+          </a:prstGeom>
+          <a:solidFill>
+            <a:schemeClr val="lt1">
+              <a:alpha val="0"/>
+            </a:schemeClr>
+          </a:solidFill>
+          <a:ln w="25400" cap="flat" cmpd="sng" algn="ctr">
+            <a:noFill/>
+            <a:prstDash val="solid"/>
+          </a:ln>
+          <a:effectLst/>
+        </p:spPr>
+        <p:txBody>
+          <a:bodyPr vert="horz" lIns="91440" tIns="45720" rIns="91440" bIns="45720" rtlCol="0">
+            <a:noAutofit/>
+          </a:bodyPr>
+          <a:lstStyle>
+            <a:lvl1pPr marL="342900" indent="-342900" algn="l" defTabSz="457200" rtl="0" eaLnBrk="1" latinLnBrk="0" hangingPunct="1">
+              <a:spcBef>
+                <a:spcPct val="20000"/>
+              </a:spcBef>
+              <a:buFont typeface="Arial"/>
+              <a:buChar char="•"/>
+              <a:defRPr sz="2800" kern="1200">
+                <a:solidFill>
+                  <a:schemeClr val="tx1"/>
+                </a:solidFill>
+                <a:latin typeface="+mn-lt"/>
+                <a:ea typeface="+mn-ea"/>
+                <a:cs typeface="+mn-cs"/>
+              </a:defRPr>
+            </a:lvl1pPr>
+            <a:lvl2pPr marL="742950" indent="-285750" algn="l" defTabSz="457200" rtl="0" eaLnBrk="1" latinLnBrk="0" hangingPunct="1">
+              <a:spcBef>
+                <a:spcPct val="20000"/>
+              </a:spcBef>
+              <a:buFont typeface="Arial"/>
+              <a:buChar char="–"/>
+              <a:defRPr sz="2400" kern="1200">
+                <a:solidFill>
+                  <a:schemeClr val="tx1"/>
+                </a:solidFill>
+                <a:latin typeface="+mn-lt"/>
+                <a:ea typeface="+mn-ea"/>
+                <a:cs typeface="+mn-cs"/>
+              </a:defRPr>
+            </a:lvl2pPr>
+            <a:lvl3pPr marL="1143000" indent="-228600" algn="l" defTabSz="457200" rtl="0" eaLnBrk="1" latinLnBrk="0" hangingPunct="1">
+              <a:spcBef>
+                <a:spcPct val="20000"/>
+              </a:spcBef>
+              <a:buFont typeface="Arial"/>
+              <a:buChar char="•"/>
+              <a:defRPr sz="2000" kern="1200">
+                <a:solidFill>
+                  <a:schemeClr val="tx1"/>
+                </a:solidFill>
+                <a:latin typeface="+mn-lt"/>
+                <a:ea typeface="+mn-ea"/>
+                <a:cs typeface="+mn-cs"/>
+              </a:defRPr>
+            </a:lvl3pPr>
+            <a:lvl4pPr marL="1600200" indent="-228600" algn="l" defTabSz="457200" rtl="0" eaLnBrk="1" latinLnBrk="0" hangingPunct="1">
+              <a:spcBef>
+                <a:spcPct val="20000"/>
+              </a:spcBef>
+              <a:buFont typeface="Arial"/>
+              <a:buChar char="–"/>
+              <a:defRPr sz="1800" kern="1200">
+                <a:solidFill>
+                  <a:schemeClr val="tx1"/>
+                </a:solidFill>
+                <a:latin typeface="+mn-lt"/>
+                <a:ea typeface="+mn-ea"/>
+                <a:cs typeface="+mn-cs"/>
+              </a:defRPr>
+            </a:lvl4pPr>
+            <a:lvl5pPr marL="2057400" indent="-228600" algn="l" defTabSz="457200" rtl="0" eaLnBrk="1" latinLnBrk="0" hangingPunct="1">
+              <a:spcBef>
+                <a:spcPct val="20000"/>
+              </a:spcBef>
+              <a:buFont typeface="Arial"/>
+              <a:buChar char="»"/>
+              <a:defRPr sz="1800" kern="1200">
+                <a:solidFill>
+                  <a:schemeClr val="tx1"/>
+                </a:solidFill>
+                <a:latin typeface="+mn-lt"/>
+                <a:ea typeface="+mn-ea"/>
+                <a:cs typeface="+mn-cs"/>
+              </a:defRPr>
+            </a:lvl5pPr>
+            <a:lvl6pPr marL="2514600" indent="-228600" algn="l" defTabSz="457200" rtl="0" eaLnBrk="1" latinLnBrk="0" hangingPunct="1">
+              <a:spcBef>
+                <a:spcPct val="20000"/>
+              </a:spcBef>
+              <a:buFont typeface="Arial"/>
+              <a:buChar char="•"/>
+              <a:defRPr sz="1800" kern="1200">
+                <a:solidFill>
+                  <a:schemeClr val="tx1"/>
+                </a:solidFill>
+                <a:latin typeface="+mn-lt"/>
+                <a:ea typeface="+mn-ea"/>
+                <a:cs typeface="+mn-cs"/>
+              </a:defRPr>
+            </a:lvl6pPr>
+            <a:lvl7pPr marL="2971800" indent="-228600" algn="l" defTabSz="457200" rtl="0" eaLnBrk="1" latinLnBrk="0" hangingPunct="1">
+              <a:spcBef>
+                <a:spcPct val="20000"/>
+              </a:spcBef>
+              <a:buFont typeface="Arial"/>
+              <a:buChar char="•"/>
+              <a:defRPr sz="1800" kern="1200">
+                <a:solidFill>
+                  <a:schemeClr val="tx1"/>
+                </a:solidFill>
+                <a:latin typeface="+mn-lt"/>
+                <a:ea typeface="+mn-ea"/>
+                <a:cs typeface="+mn-cs"/>
+              </a:defRPr>
+            </a:lvl7pPr>
+            <a:lvl8pPr marL="3429000" indent="-228600" algn="l" defTabSz="457200" rtl="0" eaLnBrk="1" latinLnBrk="0" hangingPunct="1">
+              <a:spcBef>
+                <a:spcPct val="20000"/>
+              </a:spcBef>
+              <a:buFont typeface="Arial"/>
+              <a:buChar char="•"/>
+              <a:defRPr sz="1800" kern="1200">
+                <a:solidFill>
+                  <a:schemeClr val="tx1"/>
+                </a:solidFill>
+                <a:latin typeface="+mn-lt"/>
+                <a:ea typeface="+mn-ea"/>
+                <a:cs typeface="+mn-cs"/>
+              </a:defRPr>
+            </a:lvl8pPr>
+            <a:lvl9pPr marL="3886200" indent="-228600" algn="l" defTabSz="457200" rtl="0" eaLnBrk="1" latinLnBrk="0" hangingPunct="1">
+              <a:spcBef>
+                <a:spcPct val="20000"/>
+              </a:spcBef>
+              <a:buFont typeface="Arial"/>
+              <a:buChar char="•"/>
+              <a:defRPr sz="1800" kern="1200">
+                <a:solidFill>
+                  <a:schemeClr val="tx1"/>
+                </a:solidFill>
+                <a:latin typeface="+mn-lt"/>
+                <a:ea typeface="+mn-ea"/>
+                <a:cs typeface="+mn-cs"/>
+              </a:defRPr>
+            </a:lvl9pPr>
+          </a:lstStyle>
+          <a:p>
+            <a:pPr marL="0" indent="0" algn="ctr">
+              <a:buFont typeface="Arial"/>
+              <a:buNone/>
+            </a:pPr>
+            <a:r>
+              <a:rPr lang="en-US" sz="15000" dirty="0" smtClean="0">
+                <a:latin typeface="Pokemon pixels 1"/>
+                <a:cs typeface="Pokemon pixels 1"/>
+              </a:rPr>
+              <a:t>L=</a:t>
+            </a:r>
+            <a:endParaRPr lang="en-US" sz="15000" dirty="0" smtClean="0">
+              <a:latin typeface="Pokemon pixels 1"/>
+              <a:cs typeface="Pokemon pixels 1"/>
+            </a:endParaRPr>
+          </a:p>
+        </p:txBody>
+      </p:sp>
     </p:spTree>
     <p:extLst>
       <p:ext uri="{BB962C8B-B14F-4D97-AF65-F5344CB8AC3E}">
@@ -3749,15 +5325,15 @@
           <a:lstStyle/>
           <a:p>
             <a:r>
-              <a:rPr lang="en-US" dirty="0" smtClean="0">
-                <a:ln w="18415" cmpd="sng">
+              <a:rPr lang="en-US" dirty="0">
+                <a:ln w="21590" cmpd="sng">
                   <a:solidFill>
-                    <a:srgbClr val="FFFFFF"/>
+                    <a:srgbClr val="558ED5"/>
                   </a:solidFill>
                   <a:prstDash val="solid"/>
                 </a:ln>
                 <a:solidFill>
-                  <a:srgbClr val="FFFFFF"/>
+                  <a:srgbClr val="FFFF00"/>
                 </a:solidFill>
                 <a:effectLst>
                   <a:outerShdw blurRad="63500" dir="3600000" algn="tl" rotWithShape="0">
@@ -3766,18 +5342,43 @@
                     </a:srgbClr>
                   </a:outerShdw>
                 </a:effectLst>
+                <a:latin typeface="Pokemon Solid Normal"/>
+                <a:cs typeface="Pokemon Solid Normal"/>
               </a:rPr>
-              <a:t>What we learned</a:t>
+              <a:t>What </a:t>
+            </a:r>
+            <a:r>
+              <a:rPr lang="en-US" dirty="0" smtClean="0">
+                <a:ln w="21590" cmpd="sng">
+                  <a:solidFill>
+                    <a:srgbClr val="558ED5"/>
+                  </a:solidFill>
+                  <a:prstDash val="solid"/>
+                </a:ln>
+                <a:solidFill>
+                  <a:srgbClr val="FFFF00"/>
+                </a:solidFill>
+                <a:effectLst>
+                  <a:outerShdw blurRad="63500" dir="3600000" algn="tl" rotWithShape="0">
+                    <a:srgbClr val="000000">
+                      <a:alpha val="70000"/>
+                    </a:srgbClr>
+                  </a:outerShdw>
+                </a:effectLst>
+                <a:latin typeface="Pokemon Solid Normal"/>
+                <a:cs typeface="Pokemon Solid Normal"/>
+              </a:rPr>
+              <a:t>We Learned</a:t>
             </a:r>
             <a:endParaRPr lang="en-US" dirty="0">
-              <a:ln w="18415" cmpd="sng">
-                <a:solidFill>
-                  <a:srgbClr val="FFFFFF"/>
+              <a:ln w="21590" cmpd="sng">
+                <a:solidFill>
+                  <a:srgbClr val="558ED5"/>
                 </a:solidFill>
                 <a:prstDash val="solid"/>
               </a:ln>
               <a:solidFill>
-                <a:srgbClr val="FFFFFF"/>
+                <a:srgbClr val="FFFF00"/>
               </a:solidFill>
               <a:effectLst>
                 <a:outerShdw blurRad="63500" dir="3600000" algn="tl" rotWithShape="0">
@@ -3807,41 +5408,216 @@
           <a:p>
             <a:r>
               <a:rPr lang="en-US" dirty="0" smtClean="0"/>
-              <a:t>About each other</a:t>
-            </a:r>
-            <a:endParaRPr lang="en-US" dirty="0"/>
-          </a:p>
-        </p:txBody>
-      </p:sp>
-      <p:pic>
-        <p:nvPicPr>
-          <p:cNvPr id="5" name="Content Placeholder 4"/>
-          <p:cNvPicPr>
-            <a:picLocks noGrp="1" noChangeAspect="1"/>
-          </p:cNvPicPr>
-          <p:nvPr>
-            <p:ph sz="half" idx="2"/>
-          </p:nvPr>
-        </p:nvPicPr>
-        <p:blipFill>
-          <a:blip r:embed="rId2"/>
-          <a:srcRect t="12702" b="12702"/>
-          <a:stretch>
-            <a:fillRect/>
-          </a:stretch>
-        </p:blipFill>
+              <a:t>Collaboration</a:t>
+            </a:r>
+          </a:p>
+          <a:p>
+            <a:r>
+              <a:rPr lang="en-US" dirty="0" smtClean="0"/>
+              <a:t>Encouraged us to challenge ourselves</a:t>
+            </a:r>
+          </a:p>
+          <a:p>
+            <a:r>
+              <a:rPr lang="en-US" dirty="0" smtClean="0"/>
+              <a:t>Team management/motivation</a:t>
+            </a:r>
+          </a:p>
+          <a:p>
+            <a:endParaRPr lang="en-US" dirty="0" smtClean="0"/>
+          </a:p>
+          <a:p>
+            <a:endParaRPr lang="en-US" dirty="0" smtClean="0"/>
+          </a:p>
+        </p:txBody>
+      </p:sp>
+      <p:sp>
+        <p:nvSpPr>
+          <p:cNvPr id="6" name="Content Placeholder 2"/>
+          <p:cNvSpPr txBox="1">
+            <a:spLocks/>
+          </p:cNvSpPr>
+          <p:nvPr/>
+        </p:nvSpPr>
         <p:spPr>
+          <a:xfrm>
+            <a:off x="5105400" y="2841979"/>
+            <a:ext cx="4038600" cy="1899356"/>
+          </a:xfrm>
           <a:prstGeom prst="rect">
             <a:avLst/>
           </a:prstGeom>
-          <a:ln>
+          <a:solidFill>
+            <a:schemeClr val="lt1">
+              <a:alpha val="0"/>
+            </a:schemeClr>
+          </a:solidFill>
+          <a:ln w="25400" cap="flat" cmpd="sng" algn="ctr">
             <a:noFill/>
+            <a:prstDash val="solid"/>
           </a:ln>
-          <a:effectLst>
-            <a:softEdge rad="112500"/>
-          </a:effectLst>
+          <a:effectLst/>
         </p:spPr>
-      </p:pic>
+        <p:txBody>
+          <a:bodyPr vert="horz" lIns="91440" tIns="45720" rIns="91440" bIns="45720" rtlCol="0">
+            <a:noAutofit/>
+          </a:bodyPr>
+          <a:lstStyle>
+            <a:lvl1pPr marL="342900" indent="-342900" algn="l" defTabSz="457200" rtl="0" eaLnBrk="1" latinLnBrk="0" hangingPunct="1">
+              <a:spcBef>
+                <a:spcPct val="20000"/>
+              </a:spcBef>
+              <a:buFont typeface="Arial"/>
+              <a:buChar char="•"/>
+              <a:defRPr sz="2800" kern="1200">
+                <a:solidFill>
+                  <a:schemeClr val="tx1"/>
+                </a:solidFill>
+                <a:latin typeface="+mn-lt"/>
+                <a:ea typeface="+mn-ea"/>
+                <a:cs typeface="+mn-cs"/>
+              </a:defRPr>
+            </a:lvl1pPr>
+            <a:lvl2pPr marL="742950" indent="-285750" algn="l" defTabSz="457200" rtl="0" eaLnBrk="1" latinLnBrk="0" hangingPunct="1">
+              <a:spcBef>
+                <a:spcPct val="20000"/>
+              </a:spcBef>
+              <a:buFont typeface="Arial"/>
+              <a:buChar char="–"/>
+              <a:defRPr sz="2400" kern="1200">
+                <a:solidFill>
+                  <a:schemeClr val="tx1"/>
+                </a:solidFill>
+                <a:latin typeface="+mn-lt"/>
+                <a:ea typeface="+mn-ea"/>
+                <a:cs typeface="+mn-cs"/>
+              </a:defRPr>
+            </a:lvl2pPr>
+            <a:lvl3pPr marL="1143000" indent="-228600" algn="l" defTabSz="457200" rtl="0" eaLnBrk="1" latinLnBrk="0" hangingPunct="1">
+              <a:spcBef>
+                <a:spcPct val="20000"/>
+              </a:spcBef>
+              <a:buFont typeface="Arial"/>
+              <a:buChar char="•"/>
+              <a:defRPr sz="2000" kern="1200">
+                <a:solidFill>
+                  <a:schemeClr val="tx1"/>
+                </a:solidFill>
+                <a:latin typeface="+mn-lt"/>
+                <a:ea typeface="+mn-ea"/>
+                <a:cs typeface="+mn-cs"/>
+              </a:defRPr>
+            </a:lvl3pPr>
+            <a:lvl4pPr marL="1600200" indent="-228600" algn="l" defTabSz="457200" rtl="0" eaLnBrk="1" latinLnBrk="0" hangingPunct="1">
+              <a:spcBef>
+                <a:spcPct val="20000"/>
+              </a:spcBef>
+              <a:buFont typeface="Arial"/>
+              <a:buChar char="–"/>
+              <a:defRPr sz="1800" kern="1200">
+                <a:solidFill>
+                  <a:schemeClr val="tx1"/>
+                </a:solidFill>
+                <a:latin typeface="+mn-lt"/>
+                <a:ea typeface="+mn-ea"/>
+                <a:cs typeface="+mn-cs"/>
+              </a:defRPr>
+            </a:lvl4pPr>
+            <a:lvl5pPr marL="2057400" indent="-228600" algn="l" defTabSz="457200" rtl="0" eaLnBrk="1" latinLnBrk="0" hangingPunct="1">
+              <a:spcBef>
+                <a:spcPct val="20000"/>
+              </a:spcBef>
+              <a:buFont typeface="Arial"/>
+              <a:buChar char="»"/>
+              <a:defRPr sz="1800" kern="1200">
+                <a:solidFill>
+                  <a:schemeClr val="tx1"/>
+                </a:solidFill>
+                <a:latin typeface="+mn-lt"/>
+                <a:ea typeface="+mn-ea"/>
+                <a:cs typeface="+mn-cs"/>
+              </a:defRPr>
+            </a:lvl5pPr>
+            <a:lvl6pPr marL="2514600" indent="-228600" algn="l" defTabSz="457200" rtl="0" eaLnBrk="1" latinLnBrk="0" hangingPunct="1">
+              <a:spcBef>
+                <a:spcPct val="20000"/>
+              </a:spcBef>
+              <a:buFont typeface="Arial"/>
+              <a:buChar char="•"/>
+              <a:defRPr sz="1800" kern="1200">
+                <a:solidFill>
+                  <a:schemeClr val="tx1"/>
+                </a:solidFill>
+                <a:latin typeface="+mn-lt"/>
+                <a:ea typeface="+mn-ea"/>
+                <a:cs typeface="+mn-cs"/>
+              </a:defRPr>
+            </a:lvl6pPr>
+            <a:lvl7pPr marL="2971800" indent="-228600" algn="l" defTabSz="457200" rtl="0" eaLnBrk="1" latinLnBrk="0" hangingPunct="1">
+              <a:spcBef>
+                <a:spcPct val="20000"/>
+              </a:spcBef>
+              <a:buFont typeface="Arial"/>
+              <a:buChar char="•"/>
+              <a:defRPr sz="1800" kern="1200">
+                <a:solidFill>
+                  <a:schemeClr val="tx1"/>
+                </a:solidFill>
+                <a:latin typeface="+mn-lt"/>
+                <a:ea typeface="+mn-ea"/>
+                <a:cs typeface="+mn-cs"/>
+              </a:defRPr>
+            </a:lvl7pPr>
+            <a:lvl8pPr marL="3429000" indent="-228600" algn="l" defTabSz="457200" rtl="0" eaLnBrk="1" latinLnBrk="0" hangingPunct="1">
+              <a:spcBef>
+                <a:spcPct val="20000"/>
+              </a:spcBef>
+              <a:buFont typeface="Arial"/>
+              <a:buChar char="•"/>
+              <a:defRPr sz="1800" kern="1200">
+                <a:solidFill>
+                  <a:schemeClr val="tx1"/>
+                </a:solidFill>
+                <a:latin typeface="+mn-lt"/>
+                <a:ea typeface="+mn-ea"/>
+                <a:cs typeface="+mn-cs"/>
+              </a:defRPr>
+            </a:lvl8pPr>
+            <a:lvl9pPr marL="3886200" indent="-228600" algn="l" defTabSz="457200" rtl="0" eaLnBrk="1" latinLnBrk="0" hangingPunct="1">
+              <a:spcBef>
+                <a:spcPct val="20000"/>
+              </a:spcBef>
+              <a:buFont typeface="Arial"/>
+              <a:buChar char="•"/>
+              <a:defRPr sz="1800" kern="1200">
+                <a:solidFill>
+                  <a:schemeClr val="tx1"/>
+                </a:solidFill>
+                <a:latin typeface="+mn-lt"/>
+                <a:ea typeface="+mn-ea"/>
+                <a:cs typeface="+mn-cs"/>
+              </a:defRPr>
+            </a:lvl9pPr>
+          </a:lstStyle>
+          <a:p>
+            <a:pPr marL="0" indent="0" algn="ctr">
+              <a:buFont typeface="Arial"/>
+              <a:buNone/>
+            </a:pPr>
+            <a:r>
+              <a:rPr lang="en-US" sz="15000" dirty="0" smtClean="0">
+                <a:latin typeface="Pokemon pixels 1"/>
+                <a:cs typeface="Pokemon pixels 1"/>
+              </a:rPr>
+              <a:t>t</a:t>
+            </a:r>
+            <a:endParaRPr lang="en-US" sz="15000" dirty="0" smtClean="0">
+              <a:latin typeface="Pokemon pixels 1"/>
+              <a:cs typeface="Pokemon pixels 1"/>
+            </a:endParaRPr>
+          </a:p>
+        </p:txBody>
+      </p:sp>
     </p:spTree>
     <p:extLst>
       <p:ext uri="{BB962C8B-B14F-4D97-AF65-F5344CB8AC3E}">
@@ -3888,15 +5664,18 @@
           <a:lstStyle/>
           <a:p>
             <a:r>
-              <a:rPr lang="en-US" sz="3600" dirty="0" smtClean="0">
-                <a:ln w="18415" cmpd="sng">
+              <a:rPr lang="en-US" sz="3600" dirty="0">
+                <a:ln w="21590" cmpd="sng">
                   <a:solidFill>
-                    <a:srgbClr val="FFFFFF"/>
+                    <a:schemeClr val="tx2">
+                      <a:lumMod val="60000"/>
+                      <a:lumOff val="40000"/>
+                    </a:schemeClr>
                   </a:solidFill>
                   <a:prstDash val="solid"/>
                 </a:ln>
                 <a:solidFill>
-                  <a:srgbClr val="FFFFFF"/>
+                  <a:srgbClr val="FFFF00"/>
                 </a:solidFill>
                 <a:effectLst>
                   <a:outerShdw blurRad="63500" dir="3600000" algn="tl" rotWithShape="0">
@@ -3905,18 +5684,49 @@
                     </a:srgbClr>
                   </a:outerShdw>
                 </a:effectLst>
+                <a:latin typeface="Pokemon Solid Normal"/>
+                <a:cs typeface="Pokemon Solid Normal"/>
               </a:rPr>
-              <a:t>What would we do differently?</a:t>
+              <a:t>What </a:t>
+            </a:r>
+            <a:r>
+              <a:rPr lang="en-US" sz="3600" dirty="0" smtClean="0">
+                <a:ln w="21590" cmpd="sng">
+                  <a:solidFill>
+                    <a:schemeClr val="tx2">
+                      <a:lumMod val="60000"/>
+                      <a:lumOff val="40000"/>
+                    </a:schemeClr>
+                  </a:solidFill>
+                  <a:prstDash val="solid"/>
+                </a:ln>
+                <a:solidFill>
+                  <a:srgbClr val="FFFF00"/>
+                </a:solidFill>
+                <a:effectLst>
+                  <a:outerShdw blurRad="63500" dir="3600000" algn="tl" rotWithShape="0">
+                    <a:srgbClr val="000000">
+                      <a:alpha val="70000"/>
+                    </a:srgbClr>
+                  </a:outerShdw>
+                </a:effectLst>
+                <a:latin typeface="Pokemon Solid Normal"/>
+                <a:cs typeface="Pokemon Solid Normal"/>
+              </a:rPr>
+              <a:t>would we do differently?</a:t>
             </a:r>
             <a:endParaRPr lang="en-US" sz="3600" dirty="0">
-              <a:ln w="18415" cmpd="sng">
-                <a:solidFill>
-                  <a:srgbClr val="FFFFFF"/>
+              <a:ln w="21590" cmpd="sng">
+                <a:solidFill>
+                  <a:schemeClr val="tx2">
+                    <a:lumMod val="60000"/>
+                    <a:lumOff val="40000"/>
+                  </a:schemeClr>
                 </a:solidFill>
                 <a:prstDash val="solid"/>
               </a:ln>
               <a:solidFill>
-                <a:srgbClr val="FFFFFF"/>
+                <a:srgbClr val="FFFF00"/>
               </a:solidFill>
               <a:effectLst>
                 <a:outerShdw blurRad="63500" dir="3600000" algn="tl" rotWithShape="0">
@@ -3925,6 +5735,8 @@
                   </a:srgbClr>
                 </a:outerShdw>
               </a:effectLst>
+              <a:latin typeface="Pokemon Solid Normal"/>
+              <a:cs typeface="Pokemon Solid Normal"/>
             </a:endParaRPr>
           </a:p>
         </p:txBody>
@@ -3946,41 +5758,204 @@
           <a:p>
             <a:r>
               <a:rPr lang="en-US" dirty="0" smtClean="0"/>
-              <a:t>We did everything perfectly</a:t>
-            </a:r>
+              <a:t>Be proactive</a:t>
+            </a:r>
+          </a:p>
+          <a:p>
+            <a:endParaRPr lang="en-US" dirty="0" smtClean="0"/>
+          </a:p>
+          <a:p>
             <a:endParaRPr lang="en-US" dirty="0"/>
           </a:p>
         </p:txBody>
       </p:sp>
-      <p:pic>
-        <p:nvPicPr>
-          <p:cNvPr id="5" name="Content Placeholder 4"/>
-          <p:cNvPicPr>
-            <a:picLocks noGrp="1" noChangeAspect="1"/>
-          </p:cNvPicPr>
-          <p:nvPr>
-            <p:ph sz="half" idx="2"/>
-          </p:nvPr>
-        </p:nvPicPr>
-        <p:blipFill>
-          <a:blip r:embed="rId2"/>
-          <a:srcRect t="7975" b="7975"/>
-          <a:stretch>
-            <a:fillRect/>
-          </a:stretch>
-        </p:blipFill>
+      <p:sp>
+        <p:nvSpPr>
+          <p:cNvPr id="6" name="Content Placeholder 2"/>
+          <p:cNvSpPr txBox="1">
+            <a:spLocks/>
+          </p:cNvSpPr>
+          <p:nvPr/>
+        </p:nvSpPr>
         <p:spPr>
+          <a:xfrm>
+            <a:off x="5105400" y="2841979"/>
+            <a:ext cx="4038600" cy="1899356"/>
+          </a:xfrm>
           <a:prstGeom prst="rect">
             <a:avLst/>
           </a:prstGeom>
-          <a:ln>
+          <a:solidFill>
+            <a:schemeClr val="lt1">
+              <a:alpha val="0"/>
+            </a:schemeClr>
+          </a:solidFill>
+          <a:ln w="25400" cap="flat" cmpd="sng" algn="ctr">
             <a:noFill/>
+            <a:prstDash val="solid"/>
           </a:ln>
-          <a:effectLst>
-            <a:softEdge rad="112500"/>
-          </a:effectLst>
+          <a:effectLst/>
         </p:spPr>
-      </p:pic>
+        <p:txBody>
+          <a:bodyPr vert="horz" lIns="91440" tIns="45720" rIns="91440" bIns="45720" rtlCol="0">
+            <a:noAutofit/>
+          </a:bodyPr>
+          <a:lstStyle>
+            <a:lvl1pPr marL="342900" indent="-342900" algn="l" defTabSz="457200" rtl="0" eaLnBrk="1" latinLnBrk="0" hangingPunct="1">
+              <a:spcBef>
+                <a:spcPct val="20000"/>
+              </a:spcBef>
+              <a:buFont typeface="Arial"/>
+              <a:buChar char="•"/>
+              <a:defRPr sz="2800" kern="1200">
+                <a:solidFill>
+                  <a:schemeClr val="tx1"/>
+                </a:solidFill>
+                <a:latin typeface="+mn-lt"/>
+                <a:ea typeface="+mn-ea"/>
+                <a:cs typeface="+mn-cs"/>
+              </a:defRPr>
+            </a:lvl1pPr>
+            <a:lvl2pPr marL="742950" indent="-285750" algn="l" defTabSz="457200" rtl="0" eaLnBrk="1" latinLnBrk="0" hangingPunct="1">
+              <a:spcBef>
+                <a:spcPct val="20000"/>
+              </a:spcBef>
+              <a:buFont typeface="Arial"/>
+              <a:buChar char="–"/>
+              <a:defRPr sz="2400" kern="1200">
+                <a:solidFill>
+                  <a:schemeClr val="tx1"/>
+                </a:solidFill>
+                <a:latin typeface="+mn-lt"/>
+                <a:ea typeface="+mn-ea"/>
+                <a:cs typeface="+mn-cs"/>
+              </a:defRPr>
+            </a:lvl2pPr>
+            <a:lvl3pPr marL="1143000" indent="-228600" algn="l" defTabSz="457200" rtl="0" eaLnBrk="1" latinLnBrk="0" hangingPunct="1">
+              <a:spcBef>
+                <a:spcPct val="20000"/>
+              </a:spcBef>
+              <a:buFont typeface="Arial"/>
+              <a:buChar char="•"/>
+              <a:defRPr sz="2000" kern="1200">
+                <a:solidFill>
+                  <a:schemeClr val="tx1"/>
+                </a:solidFill>
+                <a:latin typeface="+mn-lt"/>
+                <a:ea typeface="+mn-ea"/>
+                <a:cs typeface="+mn-cs"/>
+              </a:defRPr>
+            </a:lvl3pPr>
+            <a:lvl4pPr marL="1600200" indent="-228600" algn="l" defTabSz="457200" rtl="0" eaLnBrk="1" latinLnBrk="0" hangingPunct="1">
+              <a:spcBef>
+                <a:spcPct val="20000"/>
+              </a:spcBef>
+              <a:buFont typeface="Arial"/>
+              <a:buChar char="–"/>
+              <a:defRPr sz="1800" kern="1200">
+                <a:solidFill>
+                  <a:schemeClr val="tx1"/>
+                </a:solidFill>
+                <a:latin typeface="+mn-lt"/>
+                <a:ea typeface="+mn-ea"/>
+                <a:cs typeface="+mn-cs"/>
+              </a:defRPr>
+            </a:lvl4pPr>
+            <a:lvl5pPr marL="2057400" indent="-228600" algn="l" defTabSz="457200" rtl="0" eaLnBrk="1" latinLnBrk="0" hangingPunct="1">
+              <a:spcBef>
+                <a:spcPct val="20000"/>
+              </a:spcBef>
+              <a:buFont typeface="Arial"/>
+              <a:buChar char="»"/>
+              <a:defRPr sz="1800" kern="1200">
+                <a:solidFill>
+                  <a:schemeClr val="tx1"/>
+                </a:solidFill>
+                <a:latin typeface="+mn-lt"/>
+                <a:ea typeface="+mn-ea"/>
+                <a:cs typeface="+mn-cs"/>
+              </a:defRPr>
+            </a:lvl5pPr>
+            <a:lvl6pPr marL="2514600" indent="-228600" algn="l" defTabSz="457200" rtl="0" eaLnBrk="1" latinLnBrk="0" hangingPunct="1">
+              <a:spcBef>
+                <a:spcPct val="20000"/>
+              </a:spcBef>
+              <a:buFont typeface="Arial"/>
+              <a:buChar char="•"/>
+              <a:defRPr sz="1800" kern="1200">
+                <a:solidFill>
+                  <a:schemeClr val="tx1"/>
+                </a:solidFill>
+                <a:latin typeface="+mn-lt"/>
+                <a:ea typeface="+mn-ea"/>
+                <a:cs typeface="+mn-cs"/>
+              </a:defRPr>
+            </a:lvl6pPr>
+            <a:lvl7pPr marL="2971800" indent="-228600" algn="l" defTabSz="457200" rtl="0" eaLnBrk="1" latinLnBrk="0" hangingPunct="1">
+              <a:spcBef>
+                <a:spcPct val="20000"/>
+              </a:spcBef>
+              <a:buFont typeface="Arial"/>
+              <a:buChar char="•"/>
+              <a:defRPr sz="1800" kern="1200">
+                <a:solidFill>
+                  <a:schemeClr val="tx1"/>
+                </a:solidFill>
+                <a:latin typeface="+mn-lt"/>
+                <a:ea typeface="+mn-ea"/>
+                <a:cs typeface="+mn-cs"/>
+              </a:defRPr>
+            </a:lvl7pPr>
+            <a:lvl8pPr marL="3429000" indent="-228600" algn="l" defTabSz="457200" rtl="0" eaLnBrk="1" latinLnBrk="0" hangingPunct="1">
+              <a:spcBef>
+                <a:spcPct val="20000"/>
+              </a:spcBef>
+              <a:buFont typeface="Arial"/>
+              <a:buChar char="•"/>
+              <a:defRPr sz="1800" kern="1200">
+                <a:solidFill>
+                  <a:schemeClr val="tx1"/>
+                </a:solidFill>
+                <a:latin typeface="+mn-lt"/>
+                <a:ea typeface="+mn-ea"/>
+                <a:cs typeface="+mn-cs"/>
+              </a:defRPr>
+            </a:lvl8pPr>
+            <a:lvl9pPr marL="3886200" indent="-228600" algn="l" defTabSz="457200" rtl="0" eaLnBrk="1" latinLnBrk="0" hangingPunct="1">
+              <a:spcBef>
+                <a:spcPct val="20000"/>
+              </a:spcBef>
+              <a:buFont typeface="Arial"/>
+              <a:buChar char="•"/>
+              <a:defRPr sz="1800" kern="1200">
+                <a:solidFill>
+                  <a:schemeClr val="tx1"/>
+                </a:solidFill>
+                <a:latin typeface="+mn-lt"/>
+                <a:ea typeface="+mn-ea"/>
+                <a:cs typeface="+mn-cs"/>
+              </a:defRPr>
+            </a:lvl9pPr>
+          </a:lstStyle>
+          <a:p>
+            <a:pPr marL="0" indent="0" algn="ctr">
+              <a:buFont typeface="Arial"/>
+              <a:buNone/>
+            </a:pPr>
+            <a:r>
+              <a:rPr lang="en-US" sz="15000" dirty="0">
+                <a:latin typeface="Pokemon pixels 1"/>
+                <a:cs typeface="Pokemon pixels 1"/>
+              </a:rPr>
+              <a:t>j</a:t>
+            </a:r>
+            <a:endParaRPr lang="en-US" sz="15000" dirty="0" smtClean="0">
+              <a:latin typeface="Pokemon pixels 1"/>
+              <a:cs typeface="Pokemon pixels 1"/>
+            </a:endParaRPr>
+          </a:p>
+        </p:txBody>
+      </p:sp>
     </p:spTree>
     <p:extLst>
       <p:ext uri="{BB962C8B-B14F-4D97-AF65-F5344CB8AC3E}">
@@ -4028,14 +6003,14 @@
           <a:p>
             <a:r>
               <a:rPr lang="en-US" sz="3600" dirty="0" smtClean="0">
-                <a:ln w="18415" cmpd="sng">
+                <a:ln w="21590" cmpd="sng">
                   <a:solidFill>
-                    <a:srgbClr val="FFFFFF"/>
+                    <a:srgbClr val="558ED5"/>
                   </a:solidFill>
                   <a:prstDash val="solid"/>
                 </a:ln>
                 <a:solidFill>
-                  <a:srgbClr val="FFFFFF"/>
+                  <a:srgbClr val="FFFF00"/>
                 </a:solidFill>
                 <a:effectLst>
                   <a:outerShdw blurRad="63500" dir="3600000" algn="tl" rotWithShape="0">
@@ -4044,18 +6019,20 @@
                     </a:srgbClr>
                   </a:outerShdw>
                 </a:effectLst>
+                <a:latin typeface="Pokemon Solid Normal"/>
+                <a:cs typeface="Pokemon Solid Normal"/>
               </a:rPr>
-              <a:t>How to better the project?</a:t>
+              <a:t>How to make the project better</a:t>
             </a:r>
             <a:endParaRPr lang="en-US" sz="3600" dirty="0">
-              <a:ln w="18415" cmpd="sng">
-                <a:solidFill>
-                  <a:srgbClr val="FFFFFF"/>
+              <a:ln w="21590" cmpd="sng">
+                <a:solidFill>
+                  <a:srgbClr val="558ED5"/>
                 </a:solidFill>
                 <a:prstDash val="solid"/>
               </a:ln>
               <a:solidFill>
-                <a:srgbClr val="FFFFFF"/>
+                <a:srgbClr val="FFFF00"/>
               </a:solidFill>
               <a:effectLst>
                 <a:outerShdw blurRad="63500" dir="3600000" algn="tl" rotWithShape="0">
@@ -4064,6 +6041,8 @@
                   </a:srgbClr>
                 </a:outerShdw>
               </a:effectLst>
+              <a:latin typeface="Pokemon Solid Normal"/>
+              <a:cs typeface="Pokemon Solid Normal"/>
             </a:endParaRPr>
           </a:p>
         </p:txBody>
@@ -4085,48 +6064,205 @@
           <a:p>
             <a:r>
               <a:rPr lang="en-US" dirty="0" smtClean="0"/>
-              <a:t>Make it harder</a:t>
+              <a:t>Reward for challenging yourself</a:t>
             </a:r>
           </a:p>
           <a:p>
             <a:r>
               <a:rPr lang="en-US" dirty="0" smtClean="0"/>
-              <a:t>Make the factory 3D</a:t>
-            </a:r>
-          </a:p>
-          <a:p>
-            <a:r>
-              <a:rPr lang="en-US" dirty="0" smtClean="0"/>
-              <a:t>Create a website interface</a:t>
-            </a:r>
-          </a:p>
-          <a:p>
+              <a:t>Make the project more relevant to the industry </a:t>
+            </a:r>
             <a:endParaRPr lang="en-US" dirty="0" smtClean="0"/>
           </a:p>
-          <a:p>
-            <a:endParaRPr lang="en-US" dirty="0"/>
-          </a:p>
-        </p:txBody>
-      </p:sp>
-      <p:pic>
-        <p:nvPicPr>
-          <p:cNvPr id="5" name="Content Placeholder 4"/>
-          <p:cNvPicPr>
-            <a:picLocks noGrp="1" noChangeAspect="1"/>
-          </p:cNvPicPr>
-          <p:nvPr>
-            <p:ph sz="half" idx="2"/>
-          </p:nvPr>
-        </p:nvPicPr>
-        <p:blipFill>
-          <a:blip r:embed="rId2"/>
-          <a:srcRect t="13901" b="13901"/>
-          <a:stretch>
-            <a:fillRect/>
-          </a:stretch>
-        </p:blipFill>
-        <p:spPr/>
-      </p:pic>
+        </p:txBody>
+      </p:sp>
+      <p:sp>
+        <p:nvSpPr>
+          <p:cNvPr id="6" name="Content Placeholder 2"/>
+          <p:cNvSpPr txBox="1">
+            <a:spLocks/>
+          </p:cNvSpPr>
+          <p:nvPr/>
+        </p:nvSpPr>
+        <p:spPr>
+          <a:xfrm>
+            <a:off x="5105400" y="2841979"/>
+            <a:ext cx="4038600" cy="1899356"/>
+          </a:xfrm>
+          <a:prstGeom prst="rect">
+            <a:avLst/>
+          </a:prstGeom>
+          <a:solidFill>
+            <a:schemeClr val="lt1">
+              <a:alpha val="0"/>
+            </a:schemeClr>
+          </a:solidFill>
+          <a:ln w="25400" cap="flat" cmpd="sng" algn="ctr">
+            <a:noFill/>
+            <a:prstDash val="solid"/>
+          </a:ln>
+          <a:effectLst/>
+        </p:spPr>
+        <p:txBody>
+          <a:bodyPr vert="horz" lIns="91440" tIns="45720" rIns="91440" bIns="45720" rtlCol="0">
+            <a:noAutofit/>
+          </a:bodyPr>
+          <a:lstStyle>
+            <a:lvl1pPr marL="342900" indent="-342900" algn="l" defTabSz="457200" rtl="0" eaLnBrk="1" latinLnBrk="0" hangingPunct="1">
+              <a:spcBef>
+                <a:spcPct val="20000"/>
+              </a:spcBef>
+              <a:buFont typeface="Arial"/>
+              <a:buChar char="•"/>
+              <a:defRPr sz="2800" kern="1200">
+                <a:solidFill>
+                  <a:schemeClr val="tx1"/>
+                </a:solidFill>
+                <a:latin typeface="+mn-lt"/>
+                <a:ea typeface="+mn-ea"/>
+                <a:cs typeface="+mn-cs"/>
+              </a:defRPr>
+            </a:lvl1pPr>
+            <a:lvl2pPr marL="742950" indent="-285750" algn="l" defTabSz="457200" rtl="0" eaLnBrk="1" latinLnBrk="0" hangingPunct="1">
+              <a:spcBef>
+                <a:spcPct val="20000"/>
+              </a:spcBef>
+              <a:buFont typeface="Arial"/>
+              <a:buChar char="–"/>
+              <a:defRPr sz="2400" kern="1200">
+                <a:solidFill>
+                  <a:schemeClr val="tx1"/>
+                </a:solidFill>
+                <a:latin typeface="+mn-lt"/>
+                <a:ea typeface="+mn-ea"/>
+                <a:cs typeface="+mn-cs"/>
+              </a:defRPr>
+            </a:lvl2pPr>
+            <a:lvl3pPr marL="1143000" indent="-228600" algn="l" defTabSz="457200" rtl="0" eaLnBrk="1" latinLnBrk="0" hangingPunct="1">
+              <a:spcBef>
+                <a:spcPct val="20000"/>
+              </a:spcBef>
+              <a:buFont typeface="Arial"/>
+              <a:buChar char="•"/>
+              <a:defRPr sz="2000" kern="1200">
+                <a:solidFill>
+                  <a:schemeClr val="tx1"/>
+                </a:solidFill>
+                <a:latin typeface="+mn-lt"/>
+                <a:ea typeface="+mn-ea"/>
+                <a:cs typeface="+mn-cs"/>
+              </a:defRPr>
+            </a:lvl3pPr>
+            <a:lvl4pPr marL="1600200" indent="-228600" algn="l" defTabSz="457200" rtl="0" eaLnBrk="1" latinLnBrk="0" hangingPunct="1">
+              <a:spcBef>
+                <a:spcPct val="20000"/>
+              </a:spcBef>
+              <a:buFont typeface="Arial"/>
+              <a:buChar char="–"/>
+              <a:defRPr sz="1800" kern="1200">
+                <a:solidFill>
+                  <a:schemeClr val="tx1"/>
+                </a:solidFill>
+                <a:latin typeface="+mn-lt"/>
+                <a:ea typeface="+mn-ea"/>
+                <a:cs typeface="+mn-cs"/>
+              </a:defRPr>
+            </a:lvl4pPr>
+            <a:lvl5pPr marL="2057400" indent="-228600" algn="l" defTabSz="457200" rtl="0" eaLnBrk="1" latinLnBrk="0" hangingPunct="1">
+              <a:spcBef>
+                <a:spcPct val="20000"/>
+              </a:spcBef>
+              <a:buFont typeface="Arial"/>
+              <a:buChar char="»"/>
+              <a:defRPr sz="1800" kern="1200">
+                <a:solidFill>
+                  <a:schemeClr val="tx1"/>
+                </a:solidFill>
+                <a:latin typeface="+mn-lt"/>
+                <a:ea typeface="+mn-ea"/>
+                <a:cs typeface="+mn-cs"/>
+              </a:defRPr>
+            </a:lvl5pPr>
+            <a:lvl6pPr marL="2514600" indent="-228600" algn="l" defTabSz="457200" rtl="0" eaLnBrk="1" latinLnBrk="0" hangingPunct="1">
+              <a:spcBef>
+                <a:spcPct val="20000"/>
+              </a:spcBef>
+              <a:buFont typeface="Arial"/>
+              <a:buChar char="•"/>
+              <a:defRPr sz="1800" kern="1200">
+                <a:solidFill>
+                  <a:schemeClr val="tx1"/>
+                </a:solidFill>
+                <a:latin typeface="+mn-lt"/>
+                <a:ea typeface="+mn-ea"/>
+                <a:cs typeface="+mn-cs"/>
+              </a:defRPr>
+            </a:lvl6pPr>
+            <a:lvl7pPr marL="2971800" indent="-228600" algn="l" defTabSz="457200" rtl="0" eaLnBrk="1" latinLnBrk="0" hangingPunct="1">
+              <a:spcBef>
+                <a:spcPct val="20000"/>
+              </a:spcBef>
+              <a:buFont typeface="Arial"/>
+              <a:buChar char="•"/>
+              <a:defRPr sz="1800" kern="1200">
+                <a:solidFill>
+                  <a:schemeClr val="tx1"/>
+                </a:solidFill>
+                <a:latin typeface="+mn-lt"/>
+                <a:ea typeface="+mn-ea"/>
+                <a:cs typeface="+mn-cs"/>
+              </a:defRPr>
+            </a:lvl7pPr>
+            <a:lvl8pPr marL="3429000" indent="-228600" algn="l" defTabSz="457200" rtl="0" eaLnBrk="1" latinLnBrk="0" hangingPunct="1">
+              <a:spcBef>
+                <a:spcPct val="20000"/>
+              </a:spcBef>
+              <a:buFont typeface="Arial"/>
+              <a:buChar char="•"/>
+              <a:defRPr sz="1800" kern="1200">
+                <a:solidFill>
+                  <a:schemeClr val="tx1"/>
+                </a:solidFill>
+                <a:latin typeface="+mn-lt"/>
+                <a:ea typeface="+mn-ea"/>
+                <a:cs typeface="+mn-cs"/>
+              </a:defRPr>
+            </a:lvl8pPr>
+            <a:lvl9pPr marL="3886200" indent="-228600" algn="l" defTabSz="457200" rtl="0" eaLnBrk="1" latinLnBrk="0" hangingPunct="1">
+              <a:spcBef>
+                <a:spcPct val="20000"/>
+              </a:spcBef>
+              <a:buFont typeface="Arial"/>
+              <a:buChar char="•"/>
+              <a:defRPr sz="1800" kern="1200">
+                <a:solidFill>
+                  <a:schemeClr val="tx1"/>
+                </a:solidFill>
+                <a:latin typeface="+mn-lt"/>
+                <a:ea typeface="+mn-ea"/>
+                <a:cs typeface="+mn-cs"/>
+              </a:defRPr>
+            </a:lvl9pPr>
+          </a:lstStyle>
+          <a:p>
+            <a:pPr marL="0" indent="0" algn="ctr">
+              <a:buFont typeface="Arial"/>
+              <a:buNone/>
+            </a:pPr>
+            <a:r>
+              <a:rPr lang="en-US" sz="15000" dirty="0" smtClean="0">
+                <a:latin typeface="Pokemon pixels 1"/>
+                <a:cs typeface="Pokemon pixels 1"/>
+              </a:rPr>
+              <a:t>2</a:t>
+            </a:r>
+            <a:endParaRPr lang="en-US" sz="15000" dirty="0" smtClean="0">
+              <a:latin typeface="Pokemon pixels 1"/>
+              <a:cs typeface="Pokemon pixels 1"/>
+            </a:endParaRPr>
+          </a:p>
+        </p:txBody>
+      </p:sp>
     </p:spTree>
     <p:extLst>
       <p:ext uri="{BB962C8B-B14F-4D97-AF65-F5344CB8AC3E}">
@@ -4173,48 +6309,29 @@
           <a:lstStyle/>
           <a:p>
             <a:r>
-              <a:rPr lang="en-US" dirty="0" smtClean="0"/>
-              <a:t>Meet our </a:t>
+              <a:rPr lang="en-US" dirty="0" smtClean="0">
+                <a:ln w="21590" cmpd="sng">
+                  <a:solidFill>
+                    <a:srgbClr val="558ED5"/>
+                  </a:solidFill>
+                  <a:prstDash val="solid"/>
+                </a:ln>
+                <a:solidFill>
+                  <a:srgbClr val="FFFF00"/>
+                </a:solidFill>
+                <a:effectLst>
+                  <a:outerShdw blurRad="63500" dir="3600000" algn="tl" rotWithShape="0">
+                    <a:srgbClr val="000000">
+                      <a:alpha val="70000"/>
+                    </a:srgbClr>
+                  </a:outerShdw>
+                </a:effectLst>
+                <a:latin typeface="Pokemon Solid Normal"/>
+                <a:cs typeface="Pokemon Solid Normal"/>
+              </a:rPr>
+              <a:t>Meet the team</a:t>
             </a:r>
             <a:endParaRPr lang="en-US" dirty="0"/>
-          </a:p>
-        </p:txBody>
-      </p:sp>
-      <p:sp>
-        <p:nvSpPr>
-          <p:cNvPr id="3" name="Content Placeholder 2"/>
-          <p:cNvSpPr>
-            <a:spLocks noGrp="1"/>
-          </p:cNvSpPr>
-          <p:nvPr>
-            <p:ph sz="half" idx="1"/>
-          </p:nvPr>
-        </p:nvSpPr>
-        <p:spPr/>
-        <p:txBody>
-          <a:bodyPr/>
-          <a:lstStyle/>
-          <a:p>
-            <a:endParaRPr lang="en-US"/>
-          </a:p>
-        </p:txBody>
-      </p:sp>
-      <p:sp>
-        <p:nvSpPr>
-          <p:cNvPr id="4" name="Content Placeholder 3"/>
-          <p:cNvSpPr>
-            <a:spLocks noGrp="1"/>
-          </p:cNvSpPr>
-          <p:nvPr>
-            <p:ph sz="half" idx="2"/>
-          </p:nvPr>
-        </p:nvSpPr>
-        <p:spPr/>
-        <p:txBody>
-          <a:bodyPr/>
-          <a:lstStyle/>
-          <a:p>
-            <a:endParaRPr lang="en-US"/>
           </a:p>
         </p:txBody>
       </p:sp>
@@ -4549,4 +6666,324 @@
   </a:objectDefaults>
   <a:extraClrSchemeLst/>
 </a:theme>
+</file>
+
+<file path=ppt/theme/theme2.xml><?xml version="1.0" encoding="utf-8"?>
+<a:theme xmlns:a="http://schemas.openxmlformats.org/drawingml/2006/main" name="Office Theme">
+  <a:themeElements>
+    <a:clrScheme name="Office">
+      <a:dk1>
+        <a:sysClr val="windowText" lastClr="000000"/>
+      </a:dk1>
+      <a:lt1>
+        <a:sysClr val="window" lastClr="FFFFFF"/>
+      </a:lt1>
+      <a:dk2>
+        <a:srgbClr val="1F497D"/>
+      </a:dk2>
+      <a:lt2>
+        <a:srgbClr val="EEECE1"/>
+      </a:lt2>
+      <a:accent1>
+        <a:srgbClr val="4F81BD"/>
+      </a:accent1>
+      <a:accent2>
+        <a:srgbClr val="C0504D"/>
+      </a:accent2>
+      <a:accent3>
+        <a:srgbClr val="9BBB59"/>
+      </a:accent3>
+      <a:accent4>
+        <a:srgbClr val="8064A2"/>
+      </a:accent4>
+      <a:accent5>
+        <a:srgbClr val="4BACC6"/>
+      </a:accent5>
+      <a:accent6>
+        <a:srgbClr val="F79646"/>
+      </a:accent6>
+      <a:hlink>
+        <a:srgbClr val="0000FF"/>
+      </a:hlink>
+      <a:folHlink>
+        <a:srgbClr val="800080"/>
+      </a:folHlink>
+    </a:clrScheme>
+    <a:fontScheme name="Office">
+      <a:majorFont>
+        <a:latin typeface="Calibri"/>
+        <a:ea typeface=""/>
+        <a:cs typeface=""/>
+        <a:font script="Jpan" typeface="ＭＳ Ｐゴシック"/>
+        <a:font script="Hang" typeface="맑은 고딕"/>
+        <a:font script="Hans" typeface="宋体"/>
+        <a:font script="Hant" typeface="新細明體"/>
+        <a:font script="Arab" typeface="Times New Roman"/>
+        <a:font script="Hebr" typeface="Times New Roman"/>
+        <a:font script="Thai" typeface="Angsana New"/>
+        <a:font script="Ethi" typeface="Nyala"/>
+        <a:font script="Beng" typeface="Vrinda"/>
+        <a:font script="Gujr" typeface="Shruti"/>
+        <a:font script="Khmr" typeface="MoolBoran"/>
+        <a:font script="Knda" typeface="Tunga"/>
+        <a:font script="Guru" typeface="Raavi"/>
+        <a:font script="Cans" typeface="Euphemia"/>
+        <a:font script="Cher" typeface="Plantagenet Cherokee"/>
+        <a:font script="Yiii" typeface="Microsoft Yi Baiti"/>
+        <a:font script="Tibt" typeface="Microsoft Himalaya"/>
+        <a:font script="Thaa" typeface="MV Boli"/>
+        <a:font script="Deva" typeface="Mangal"/>
+        <a:font script="Telu" typeface="Gautami"/>
+        <a:font script="Taml" typeface="Latha"/>
+        <a:font script="Syrc" typeface="Estrangelo Edessa"/>
+        <a:font script="Orya" typeface="Kalinga"/>
+        <a:font script="Mlym" typeface="Kartika"/>
+        <a:font script="Laoo" typeface="DokChampa"/>
+        <a:font script="Sinh" typeface="Iskoola Pota"/>
+        <a:font script="Mong" typeface="Mongolian Baiti"/>
+        <a:font script="Viet" typeface="Times New Roman"/>
+        <a:font script="Uigh" typeface="Microsoft Uighur"/>
+        <a:font script="Geor" typeface="Sylfaen"/>
+      </a:majorFont>
+      <a:minorFont>
+        <a:latin typeface="Calibri"/>
+        <a:ea typeface=""/>
+        <a:cs typeface=""/>
+        <a:font script="Jpan" typeface="ＭＳ Ｐゴシック"/>
+        <a:font script="Hang" typeface="맑은 고딕"/>
+        <a:font script="Hans" typeface="宋体"/>
+        <a:font script="Hant" typeface="新細明體"/>
+        <a:font script="Arab" typeface="Arial"/>
+        <a:font script="Hebr" typeface="Arial"/>
+        <a:font script="Thai" typeface="Cordia New"/>
+        <a:font script="Ethi" typeface="Nyala"/>
+        <a:font script="Beng" typeface="Vrinda"/>
+        <a:font script="Gujr" typeface="Shruti"/>
+        <a:font script="Khmr" typeface="DaunPenh"/>
+        <a:font script="Knda" typeface="Tunga"/>
+        <a:font script="Guru" typeface="Raavi"/>
+        <a:font script="Cans" typeface="Euphemia"/>
+        <a:font script="Cher" typeface="Plantagenet Cherokee"/>
+        <a:font script="Yiii" typeface="Microsoft Yi Baiti"/>
+        <a:font script="Tibt" typeface="Microsoft Himalaya"/>
+        <a:font script="Thaa" typeface="MV Boli"/>
+        <a:font script="Deva" typeface="Mangal"/>
+        <a:font script="Telu" typeface="Gautami"/>
+        <a:font script="Taml" typeface="Latha"/>
+        <a:font script="Syrc" typeface="Estrangelo Edessa"/>
+        <a:font script="Orya" typeface="Kalinga"/>
+        <a:font script="Mlym" typeface="Kartika"/>
+        <a:font script="Laoo" typeface="DokChampa"/>
+        <a:font script="Sinh" typeface="Iskoola Pota"/>
+        <a:font script="Mong" typeface="Mongolian Baiti"/>
+        <a:font script="Viet" typeface="Arial"/>
+        <a:font script="Uigh" typeface="Microsoft Uighur"/>
+        <a:font script="Geor" typeface="Sylfaen"/>
+      </a:minorFont>
+    </a:fontScheme>
+    <a:fmtScheme name="Office">
+      <a:fillStyleLst>
+        <a:solidFill>
+          <a:schemeClr val="phClr"/>
+        </a:solidFill>
+        <a:gradFill rotWithShape="1">
+          <a:gsLst>
+            <a:gs pos="0">
+              <a:schemeClr val="phClr">
+                <a:tint val="50000"/>
+                <a:satMod val="300000"/>
+              </a:schemeClr>
+            </a:gs>
+            <a:gs pos="35000">
+              <a:schemeClr val="phClr">
+                <a:tint val="37000"/>
+                <a:satMod val="300000"/>
+              </a:schemeClr>
+            </a:gs>
+            <a:gs pos="100000">
+              <a:schemeClr val="phClr">
+                <a:tint val="15000"/>
+                <a:satMod val="350000"/>
+              </a:schemeClr>
+            </a:gs>
+          </a:gsLst>
+          <a:lin ang="16200000" scaled="1"/>
+        </a:gradFill>
+        <a:gradFill rotWithShape="1">
+          <a:gsLst>
+            <a:gs pos="0">
+              <a:schemeClr val="phClr">
+                <a:tint val="100000"/>
+                <a:shade val="100000"/>
+                <a:satMod val="130000"/>
+              </a:schemeClr>
+            </a:gs>
+            <a:gs pos="100000">
+              <a:schemeClr val="phClr">
+                <a:tint val="50000"/>
+                <a:shade val="100000"/>
+                <a:satMod val="350000"/>
+              </a:schemeClr>
+            </a:gs>
+          </a:gsLst>
+          <a:lin ang="16200000" scaled="0"/>
+        </a:gradFill>
+      </a:fillStyleLst>
+      <a:lnStyleLst>
+        <a:ln w="9525" cap="flat" cmpd="sng" algn="ctr">
+          <a:solidFill>
+            <a:schemeClr val="phClr">
+              <a:shade val="95000"/>
+              <a:satMod val="105000"/>
+            </a:schemeClr>
+          </a:solidFill>
+          <a:prstDash val="solid"/>
+        </a:ln>
+        <a:ln w="25400" cap="flat" cmpd="sng" algn="ctr">
+          <a:solidFill>
+            <a:schemeClr val="phClr"/>
+          </a:solidFill>
+          <a:prstDash val="solid"/>
+        </a:ln>
+        <a:ln w="38100" cap="flat" cmpd="sng" algn="ctr">
+          <a:solidFill>
+            <a:schemeClr val="phClr"/>
+          </a:solidFill>
+          <a:prstDash val="solid"/>
+        </a:ln>
+      </a:lnStyleLst>
+      <a:effectStyleLst>
+        <a:effectStyle>
+          <a:effectLst>
+            <a:outerShdw blurRad="40000" dist="20000" dir="5400000" rotWithShape="0">
+              <a:srgbClr val="000000">
+                <a:alpha val="38000"/>
+              </a:srgbClr>
+            </a:outerShdw>
+          </a:effectLst>
+        </a:effectStyle>
+        <a:effectStyle>
+          <a:effectLst>
+            <a:outerShdw blurRad="40000" dist="23000" dir="5400000" rotWithShape="0">
+              <a:srgbClr val="000000">
+                <a:alpha val="35000"/>
+              </a:srgbClr>
+            </a:outerShdw>
+          </a:effectLst>
+        </a:effectStyle>
+        <a:effectStyle>
+          <a:effectLst>
+            <a:outerShdw blurRad="40000" dist="23000" dir="5400000" rotWithShape="0">
+              <a:srgbClr val="000000">
+                <a:alpha val="35000"/>
+              </a:srgbClr>
+            </a:outerShdw>
+          </a:effectLst>
+          <a:scene3d>
+            <a:camera prst="orthographicFront">
+              <a:rot lat="0" lon="0" rev="0"/>
+            </a:camera>
+            <a:lightRig rig="threePt" dir="t">
+              <a:rot lat="0" lon="0" rev="1200000"/>
+            </a:lightRig>
+          </a:scene3d>
+          <a:sp3d>
+            <a:bevelT w="63500" h="25400"/>
+          </a:sp3d>
+        </a:effectStyle>
+      </a:effectStyleLst>
+      <a:bgFillStyleLst>
+        <a:solidFill>
+          <a:schemeClr val="phClr"/>
+        </a:solidFill>
+        <a:gradFill rotWithShape="1">
+          <a:gsLst>
+            <a:gs pos="0">
+              <a:schemeClr val="phClr">
+                <a:tint val="40000"/>
+                <a:satMod val="350000"/>
+              </a:schemeClr>
+            </a:gs>
+            <a:gs pos="40000">
+              <a:schemeClr val="phClr">
+                <a:tint val="45000"/>
+                <a:shade val="99000"/>
+                <a:satMod val="350000"/>
+              </a:schemeClr>
+            </a:gs>
+            <a:gs pos="100000">
+              <a:schemeClr val="phClr">
+                <a:shade val="20000"/>
+                <a:satMod val="255000"/>
+              </a:schemeClr>
+            </a:gs>
+          </a:gsLst>
+          <a:path path="circle">
+            <a:fillToRect l="50000" t="-80000" r="50000" b="180000"/>
+          </a:path>
+        </a:gradFill>
+        <a:gradFill rotWithShape="1">
+          <a:gsLst>
+            <a:gs pos="0">
+              <a:schemeClr val="phClr">
+                <a:tint val="80000"/>
+                <a:satMod val="300000"/>
+              </a:schemeClr>
+            </a:gs>
+            <a:gs pos="100000">
+              <a:schemeClr val="phClr">
+                <a:shade val="30000"/>
+                <a:satMod val="200000"/>
+              </a:schemeClr>
+            </a:gs>
+          </a:gsLst>
+          <a:path path="circle">
+            <a:fillToRect l="50000" t="50000" r="50000" b="50000"/>
+          </a:path>
+        </a:gradFill>
+      </a:bgFillStyleLst>
+    </a:fmtScheme>
+  </a:themeElements>
+  <a:objectDefaults>
+    <a:spDef>
+      <a:spPr/>
+      <a:bodyPr/>
+      <a:lstStyle/>
+      <a:style>
+        <a:lnRef idx="1">
+          <a:schemeClr val="accent1"/>
+        </a:lnRef>
+        <a:fillRef idx="3">
+          <a:schemeClr val="accent1"/>
+        </a:fillRef>
+        <a:effectRef idx="2">
+          <a:schemeClr val="accent1"/>
+        </a:effectRef>
+        <a:fontRef idx="minor">
+          <a:schemeClr val="lt1"/>
+        </a:fontRef>
+      </a:style>
+    </a:spDef>
+    <a:lnDef>
+      <a:spPr/>
+      <a:bodyPr/>
+      <a:lstStyle/>
+      <a:style>
+        <a:lnRef idx="2">
+          <a:schemeClr val="accent1"/>
+        </a:lnRef>
+        <a:fillRef idx="0">
+          <a:schemeClr val="accent1"/>
+        </a:fillRef>
+        <a:effectRef idx="1">
+          <a:schemeClr val="accent1"/>
+        </a:effectRef>
+        <a:fontRef idx="minor">
+          <a:schemeClr val="tx1"/>
+        </a:fontRef>
+      </a:style>
+    </a:lnDef>
+  </a:objectDefaults>
+  <a:extraClrSchemeLst/>
+</a:theme>
 </file>
</xml_diff>

<commit_message>
Add team photo to ppt
</commit_message>
<xml_diff>
--- a/FactoryPresentation.pptx
+++ b/FactoryPresentation.pptx
@@ -4617,35 +4617,42 @@
                 <a:latin typeface="Pokemon Solid Normal"/>
                 <a:cs typeface="Pokemon Solid Normal"/>
               </a:rPr>
-              <a:t>Meet the </a:t>
-            </a:r>
-            <a:r>
-              <a:rPr lang="en-US" dirty="0" smtClean="0">
-                <a:ln w="21590" cmpd="sng">
-                  <a:solidFill>
-                    <a:srgbClr val="558ED5"/>
-                  </a:solidFill>
-                  <a:prstDash val="solid"/>
-                </a:ln>
-                <a:solidFill>
-                  <a:srgbClr val="FFFF00"/>
-                </a:solidFill>
-                <a:effectLst>
-                  <a:outerShdw blurRad="63500" dir="3600000" algn="tl" rotWithShape="0">
-                    <a:srgbClr val="000000">
-                      <a:alpha val="70000"/>
-                    </a:srgbClr>
-                  </a:outerShdw>
-                </a:effectLst>
-                <a:latin typeface="Pokemon Solid Normal"/>
-                <a:cs typeface="Pokemon Solid Normal"/>
-              </a:rPr>
-              <a:t>Team</a:t>
+              <a:t>Meet the Team</a:t>
             </a:r>
             <a:endParaRPr lang="en-US" dirty="0"/>
           </a:p>
         </p:txBody>
       </p:sp>
+      <p:pic>
+        <p:nvPicPr>
+          <p:cNvPr id="3" name="Picture 2"/>
+          <p:cNvPicPr>
+            <a:picLocks noChangeAspect="1"/>
+          </p:cNvPicPr>
+          <p:nvPr/>
+        </p:nvPicPr>
+        <p:blipFill>
+          <a:blip r:embed="rId2">
+            <a:extLst>
+              <a:ext uri="{28A0092B-C50C-407E-A947-70E740481C1C}">
+                <a14:useLocalDpi xmlns:a14="http://schemas.microsoft.com/office/drawing/2010/main" val="0"/>
+              </a:ext>
+            </a:extLst>
+          </a:blip>
+          <a:stretch>
+            <a:fillRect/>
+          </a:stretch>
+        </p:blipFill>
+        <p:spPr>
+          <a:xfrm>
+            <a:off x="0" y="1801907"/>
+            <a:ext cx="9248502" cy="3515445"/>
+          </a:xfrm>
+          <a:prstGeom prst="rect">
+            <a:avLst/>
+          </a:prstGeom>
+        </p:spPr>
+      </p:pic>
     </p:spTree>
     <p:extLst>
       <p:ext uri="{BB962C8B-B14F-4D97-AF65-F5344CB8AC3E}">
@@ -4715,33 +4722,7 @@
                 <a:latin typeface="Pokemon Solid Normal"/>
                 <a:cs typeface="Pokemon Solid Normal"/>
               </a:rPr>
-              <a:t>What </a:t>
-            </a:r>
-            <a:r>
-              <a:rPr lang="en-US" dirty="0" smtClean="0">
-                <a:ln w="21590" cmpd="sng">
-                  <a:solidFill>
-                    <a:schemeClr val="tx2">
-                      <a:lumMod val="60000"/>
-                      <a:lumOff val="40000"/>
-                    </a:schemeClr>
-                  </a:solidFill>
-                  <a:prstDash val="solid"/>
-                </a:ln>
-                <a:solidFill>
-                  <a:srgbClr val="FFFF00"/>
-                </a:solidFill>
-                <a:effectLst>
-                  <a:outerShdw blurRad="63500" dir="3600000" algn="tl" rotWithShape="0">
-                    <a:srgbClr val="000000">
-                      <a:alpha val="70000"/>
-                    </a:srgbClr>
-                  </a:outerShdw>
-                </a:effectLst>
-                <a:latin typeface="Pokemon Solid Normal"/>
-                <a:cs typeface="Pokemon Solid Normal"/>
-              </a:rPr>
-              <a:t>Was </a:t>
+              <a:t>What Was </a:t>
             </a:r>
             <a:r>
               <a:rPr lang="en-US" dirty="0">
@@ -4856,15 +4837,7 @@
           <a:p>
             <a:r>
               <a:rPr lang="en-US" dirty="0" smtClean="0"/>
-              <a:t>The p</a:t>
-            </a:r>
-            <a:r>
-              <a:rPr lang="en-US" dirty="0" smtClean="0"/>
-              <a:t>otential </a:t>
-            </a:r>
-            <a:r>
-              <a:rPr lang="en-US" dirty="0" smtClean="0"/>
-              <a:t>of swing</a:t>
+              <a:t>The potential of swing</a:t>
             </a:r>
           </a:p>
           <a:p>
@@ -4872,7 +4845,6 @@
               <a:rPr lang="en-US" dirty="0" smtClean="0"/>
               <a:t>Architecture</a:t>
             </a:r>
-            <a:endParaRPr lang="en-US" dirty="0" smtClean="0"/>
           </a:p>
           <a:p>
             <a:endParaRPr lang="en-US" dirty="0" smtClean="0"/>
@@ -5002,11 +4974,7 @@
           <a:p>
             <a:r>
               <a:rPr lang="en-US" dirty="0" smtClean="0"/>
-              <a:t>True </a:t>
-            </a:r>
-            <a:r>
-              <a:rPr lang="en-US" dirty="0" smtClean="0"/>
-              <a:t>object oriented programming</a:t>
+              <a:t>True object oriented programming</a:t>
             </a:r>
           </a:p>
           <a:p>
@@ -5241,53 +5209,7 @@
                 <a:latin typeface="Pokemon Solid Normal"/>
                 <a:cs typeface="Pokemon Solid Normal"/>
               </a:rPr>
-              <a:t>What </a:t>
-            </a:r>
-            <a:r>
-              <a:rPr lang="en-US" dirty="0" smtClean="0">
-                <a:ln w="21590" cmpd="sng">
-                  <a:solidFill>
-                    <a:srgbClr val="558ED5"/>
-                  </a:solidFill>
-                  <a:prstDash val="solid"/>
-                </a:ln>
-                <a:solidFill>
-                  <a:srgbClr val="FFFF00"/>
-                </a:solidFill>
-                <a:effectLst>
-                  <a:outerShdw blurRad="63500" dir="3600000" algn="tl" rotWithShape="0">
-                    <a:srgbClr val="000000">
-                      <a:alpha val="70000"/>
-                    </a:srgbClr>
-                  </a:outerShdw>
-                </a:effectLst>
-                <a:latin typeface="Pokemon Solid Normal"/>
-                <a:cs typeface="Pokemon Solid Normal"/>
-              </a:rPr>
-              <a:t>Didn’t </a:t>
-            </a:r>
-            <a:r>
-              <a:rPr lang="en-US" dirty="0" smtClean="0">
-                <a:ln w="21590" cmpd="sng">
-                  <a:solidFill>
-                    <a:srgbClr val="558ED5"/>
-                  </a:solidFill>
-                  <a:prstDash val="solid"/>
-                </a:ln>
-                <a:solidFill>
-                  <a:srgbClr val="FFFF00"/>
-                </a:solidFill>
-                <a:effectLst>
-                  <a:outerShdw blurRad="63500" dir="3600000" algn="tl" rotWithShape="0">
-                    <a:srgbClr val="000000">
-                      <a:alpha val="70000"/>
-                    </a:srgbClr>
-                  </a:outerShdw>
-                </a:effectLst>
-                <a:latin typeface="Pokemon Solid Normal"/>
-                <a:cs typeface="Pokemon Solid Normal"/>
-              </a:rPr>
-              <a:t>Work</a:t>
+              <a:t>What Didn’t Work</a:t>
             </a:r>
             <a:endParaRPr lang="en-US" dirty="0">
               <a:ln w="21590" cmpd="sng">
@@ -5998,33 +5920,7 @@
                 <a:latin typeface="Pokemon Solid Normal"/>
                 <a:cs typeface="Pokemon Solid Normal"/>
               </a:rPr>
-              <a:t>W</a:t>
-            </a:r>
-            <a:r>
-              <a:rPr lang="en-US" sz="3600" dirty="0" smtClean="0">
-                <a:ln w="21590" cmpd="sng">
-                  <a:solidFill>
-                    <a:schemeClr val="tx2">
-                      <a:lumMod val="60000"/>
-                      <a:lumOff val="40000"/>
-                    </a:schemeClr>
-                  </a:solidFill>
-                  <a:prstDash val="solid"/>
-                </a:ln>
-                <a:solidFill>
-                  <a:srgbClr val="FFFF00"/>
-                </a:solidFill>
-                <a:effectLst>
-                  <a:outerShdw blurRad="63500" dir="3600000" algn="tl" rotWithShape="0">
-                    <a:srgbClr val="000000">
-                      <a:alpha val="70000"/>
-                    </a:srgbClr>
-                  </a:outerShdw>
-                </a:effectLst>
-                <a:latin typeface="Pokemon Solid Normal"/>
-                <a:cs typeface="Pokemon Solid Normal"/>
-              </a:rPr>
-              <a:t>e Would </a:t>
+              <a:t>We Would </a:t>
             </a:r>
             <a:r>
               <a:rPr lang="en-US" sz="3600" dirty="0">
@@ -6076,59 +5972,7 @@
                 <a:latin typeface="Pokemon Solid Normal"/>
                 <a:cs typeface="Pokemon Solid Normal"/>
               </a:rPr>
-              <a:t>o </a:t>
-            </a:r>
-            <a:r>
-              <a:rPr lang="en-US" sz="3600" dirty="0" smtClean="0">
-                <a:ln w="21590" cmpd="sng">
-                  <a:solidFill>
-                    <a:schemeClr val="tx2">
-                      <a:lumMod val="60000"/>
-                      <a:lumOff val="40000"/>
-                    </a:schemeClr>
-                  </a:solidFill>
-                  <a:prstDash val="solid"/>
-                </a:ln>
-                <a:solidFill>
-                  <a:srgbClr val="FFFF00"/>
-                </a:solidFill>
-                <a:effectLst>
-                  <a:outerShdw blurRad="63500" dir="3600000" algn="tl" rotWithShape="0">
-                    <a:srgbClr val="000000">
-                      <a:alpha val="70000"/>
-                    </a:srgbClr>
-                  </a:outerShdw>
-                </a:effectLst>
-                <a:latin typeface="Pokemon Solid Normal"/>
-                <a:cs typeface="Pokemon Solid Normal"/>
-              </a:rPr>
-              <a:t>D</a:t>
-            </a:r>
-            <a:r>
-              <a:rPr lang="en-US" sz="3600" dirty="0" smtClean="0">
-                <a:ln w="21590" cmpd="sng">
-                  <a:solidFill>
-                    <a:schemeClr val="tx2">
-                      <a:lumMod val="60000"/>
-                      <a:lumOff val="40000"/>
-                    </a:schemeClr>
-                  </a:solidFill>
-                  <a:prstDash val="solid"/>
-                </a:ln>
-                <a:solidFill>
-                  <a:srgbClr val="FFFF00"/>
-                </a:solidFill>
-                <a:effectLst>
-                  <a:outerShdw blurRad="63500" dir="3600000" algn="tl" rotWithShape="0">
-                    <a:srgbClr val="000000">
-                      <a:alpha val="70000"/>
-                    </a:srgbClr>
-                  </a:outerShdw>
-                </a:effectLst>
-                <a:latin typeface="Pokemon Solid Normal"/>
-                <a:cs typeface="Pokemon Solid Normal"/>
-              </a:rPr>
-              <a:t>ifferently</a:t>
+              <a:t>o Differently</a:t>
             </a:r>
             <a:endParaRPr lang="en-US" sz="3600" dirty="0">
               <a:ln w="21590" cmpd="sng">
@@ -6200,7 +6044,6 @@
               <a:rPr lang="en-US" dirty="0" smtClean="0"/>
               <a:t>Ask questions when assigned unclear tasks</a:t>
             </a:r>
-            <a:endParaRPr lang="en-US" dirty="0" smtClean="0"/>
           </a:p>
           <a:p>
             <a:endParaRPr lang="en-US" dirty="0" smtClean="0"/>
@@ -6510,11 +6353,7 @@
           <a:p>
             <a:r>
               <a:rPr lang="en-US" dirty="0" smtClean="0"/>
-              <a:t>Reward </a:t>
-            </a:r>
-            <a:r>
-              <a:rPr lang="en-US" dirty="0" smtClean="0"/>
-              <a:t>groups for taking on challenges</a:t>
+              <a:t>Reward groups for taking on challenges</a:t>
             </a:r>
           </a:p>
           <a:p>
@@ -6526,16 +6365,11 @@
               <a:rPr lang="en-US" dirty="0" smtClean="0"/>
               <a:t>ntegrate multiple factories to create a large factory</a:t>
             </a:r>
-            <a:endParaRPr lang="en-US" dirty="0" smtClean="0"/>
           </a:p>
           <a:p>
             <a:r>
               <a:rPr lang="en-US" dirty="0" smtClean="0"/>
-              <a:t>Make the project more relevant to </a:t>
-            </a:r>
-            <a:r>
-              <a:rPr lang="en-US" dirty="0" smtClean="0"/>
-              <a:t>today’s industry</a:t>
+              <a:t>Make the project more relevant to today’s industry</a:t>
             </a:r>
           </a:p>
           <a:p>
@@ -6543,7 +6377,6 @@
               <a:rPr lang="en-US" dirty="0" smtClean="0"/>
               <a:t>Improve the grading system</a:t>
             </a:r>
-            <a:endParaRPr lang="en-US" dirty="0" smtClean="0"/>
           </a:p>
           <a:p>
             <a:endParaRPr lang="en-US" dirty="0" smtClean="0"/>

</xml_diff>